<commit_message>
update readme addd book logo
</commit_message>
<xml_diff>
--- a/slides/02-smoothing.pptx
+++ b/slides/02-smoothing.pptx
@@ -5,12 +5,14 @@
     <p:sldMasterId id="2147483684" r:id="rId1"/>
   </p:sldMasterIdLst>
   <p:notesMasterIdLst>
-    <p:notesMasterId r:id="rId5"/>
+    <p:notesMasterId r:id="rId7"/>
   </p:notesMasterIdLst>
   <p:sldIdLst>
     <p:sldId id="256" r:id="rId2"/>
     <p:sldId id="257" r:id="rId3"/>
-    <p:sldId id="274" r:id="rId4"/>
+    <p:sldId id="275" r:id="rId4"/>
+    <p:sldId id="276" r:id="rId5"/>
+    <p:sldId id="277" r:id="rId6"/>
   </p:sldIdLst>
   <p:sldSz cx="12192000" cy="6858000"/>
   <p:notesSz cx="6858000" cy="9144000"/>
@@ -3580,7 +3582,12 @@
             <p:ph idx="1"/>
           </p:nvPr>
         </p:nvSpPr>
-        <p:spPr/>
+        <p:spPr>
+          <a:xfrm>
+            <a:off x="838200" y="1690688"/>
+            <a:ext cx="10515600" cy="4486275"/>
+          </a:xfrm>
+        </p:spPr>
         <p:txBody>
           <a:bodyPr/>
           <a:lstStyle/>
@@ -3630,7 +3637,7 @@
         </p:nvSpPr>
         <p:spPr>
           <a:xfrm>
-            <a:off x="7374132" y="3428999"/>
+            <a:off x="7488432" y="3283414"/>
             <a:ext cx="522514" cy="3209460"/>
           </a:xfrm>
           <a:prstGeom prst="leftBracket">
@@ -3675,7 +3682,7 @@
         </p:nvSpPr>
         <p:spPr>
           <a:xfrm flipH="1">
-            <a:off x="8571557" y="3429000"/>
+            <a:off x="8685857" y="3283415"/>
             <a:ext cx="522513" cy="3209460"/>
           </a:xfrm>
           <a:prstGeom prst="leftBracket">
@@ -3727,7 +3734,7 @@
         </p:blipFill>
         <p:spPr>
           <a:xfrm>
-            <a:off x="7751692" y="3662168"/>
+            <a:off x="7865992" y="3516583"/>
             <a:ext cx="1032739" cy="756032"/>
           </a:xfrm>
           <a:prstGeom prst="rect">
@@ -3749,7 +3756,7 @@
         </p:nvSpPr>
         <p:spPr>
           <a:xfrm>
-            <a:off x="8137670" y="4207467"/>
+            <a:off x="8251970" y="4061882"/>
             <a:ext cx="298751" cy="1477328"/>
           </a:xfrm>
           <a:prstGeom prst="rect">
@@ -3815,7 +3822,7 @@
         </p:blipFill>
         <p:spPr>
           <a:xfrm>
-            <a:off x="7682056" y="5482344"/>
+            <a:off x="7796356" y="5336759"/>
             <a:ext cx="1172010" cy="940703"/>
           </a:xfrm>
           <a:prstGeom prst="rect">
@@ -3838,13 +3845,13 @@
           <p:nvPr>
             <p:extLst>
               <p:ext uri="{D42A27DB-BD31-4B8C-83A1-F6EECF244321}">
-                <p14:modId xmlns:p14="http://schemas.microsoft.com/office/powerpoint/2010/main" val="1580555902"/>
+                <p14:modId xmlns:p14="http://schemas.microsoft.com/office/powerpoint/2010/main" val="913006869"/>
               </p:ext>
             </p:extLst>
           </p:nvPr>
         </p:nvGraphicFramePr>
         <p:xfrm>
-          <a:off x="1676403" y="3581405"/>
+          <a:off x="1790703" y="3435820"/>
           <a:ext cx="2904732" cy="3209467"/>
         </p:xfrm>
         <a:graphic>
@@ -3899,7 +3906,7 @@
                           <a:ea typeface="CMU Serif" panose="02000603000000000000" pitchFamily="2" charset="0"/>
                           <a:cs typeface="Courier New" panose="02070309020205020404" pitchFamily="49" charset="0"/>
                         </a:rPr>
-                        <a:t>y(t</a:t>
+                        <a:t>x(t</a:t>
                       </a:r>
                       <a:r>
                         <a:rPr lang="en-GB" sz="1600" b="0" i="0" baseline="-25000" dirty="0">
@@ -3980,7 +3987,7 @@
                           <a:ea typeface="CMU Serif" panose="02000603000000000000" pitchFamily="2" charset="0"/>
                           <a:cs typeface="Courier New" panose="02070309020205020404" pitchFamily="49" charset="0"/>
                         </a:rPr>
-                        <a:t>y(t</a:t>
+                        <a:t>x(t</a:t>
                       </a:r>
                       <a:r>
                         <a:rPr lang="en-GB" sz="1600" b="0" i="0" baseline="-25000" dirty="0">
@@ -4131,7 +4138,7 @@
                           <a:ea typeface="CMU Serif" panose="02000603000000000000" pitchFamily="2" charset="0"/>
                           <a:cs typeface="Courier New" panose="02070309020205020404" pitchFamily="49" charset="0"/>
                         </a:rPr>
-                        <a:t>y(</a:t>
+                        <a:t>x(</a:t>
                       </a:r>
                       <a:r>
                         <a:rPr lang="en-GB" sz="1600" b="0" i="0" dirty="0" err="1">
@@ -5049,7 +5056,7 @@
         </p:nvCxnSpPr>
         <p:spPr>
           <a:xfrm>
-            <a:off x="4830567" y="4826000"/>
+            <a:off x="4944867" y="4680415"/>
             <a:ext cx="2294133" cy="0"/>
           </a:xfrm>
           <a:prstGeom prst="straightConnector1">
@@ -5091,8 +5098,8 @@
         </p:nvSpPr>
         <p:spPr>
           <a:xfrm>
-            <a:off x="4817869" y="3671754"/>
-            <a:ext cx="2302541" cy="923330"/>
+            <a:off x="4936459" y="3694468"/>
+            <a:ext cx="2302541" cy="646331"/>
           </a:xfrm>
           <a:prstGeom prst="rect">
             <a:avLst/>
@@ -5108,7 +5115,7 @@
             <a:pPr algn="ctr"/>
             <a:r>
               <a:rPr lang="en-GB" dirty="0"/>
-              <a:t>We do this using basis function expansions</a:t>
+              <a:t>Basis Function Expansions</a:t>
             </a:r>
           </a:p>
         </p:txBody>
@@ -5117,365 +5124,6 @@
     <p:extLst>
       <p:ext uri="{BB962C8B-B14F-4D97-AF65-F5344CB8AC3E}">
         <p14:creationId xmlns:p14="http://schemas.microsoft.com/office/powerpoint/2010/main" val="4244958497"/>
-      </p:ext>
-    </p:extLst>
-  </p:cSld>
-  <p:clrMapOvr>
-    <a:masterClrMapping/>
-  </p:clrMapOvr>
-</p:sld>
-</file>
-
-<file path=ppt/slides/slide3.xml><?xml version="1.0" encoding="utf-8"?>
-<p:sld xmlns:a="http://schemas.openxmlformats.org/drawingml/2006/main" xmlns:r="http://schemas.openxmlformats.org/officeDocument/2006/relationships" xmlns:p="http://schemas.openxmlformats.org/presentationml/2006/main">
-  <p:cSld>
-    <p:spTree>
-      <p:nvGrpSpPr>
-        <p:cNvPr id="1" name=""/>
-        <p:cNvGrpSpPr/>
-        <p:nvPr/>
-      </p:nvGrpSpPr>
-      <p:grpSpPr>
-        <a:xfrm>
-          <a:off x="0" y="0"/>
-          <a:ext cx="0" cy="0"/>
-          <a:chOff x="0" y="0"/>
-          <a:chExt cx="0" cy="0"/>
-        </a:xfrm>
-      </p:grpSpPr>
-      <p:sp>
-        <p:nvSpPr>
-          <p:cNvPr id="411657" name="Rectangle 9"/>
-          <p:cNvSpPr>
-            <a:spLocks noGrp="1" noChangeArrowheads="1"/>
-          </p:cNvSpPr>
-          <p:nvPr>
-            <p:ph type="title" idx="4294967295"/>
-          </p:nvPr>
-        </p:nvSpPr>
-        <p:spPr bwMode="auto">
-          <a:xfrm>
-            <a:off x="3000376" y="0"/>
-            <a:ext cx="6970713" cy="1143000"/>
-          </a:xfrm>
-          <a:prstGeom prst="rect">
-            <a:avLst/>
-          </a:prstGeom>
-          <a:extLst>
-            <a:ext uri="{909E8E84-426E-40DD-AFC4-6F175D3DCCD1}">
-              <a14:hiddenFill xmlns:a14="http://schemas.microsoft.com/office/drawing/2010/main">
-                <a:solidFill>
-                  <a:schemeClr val="accent1"/>
-                </a:solidFill>
-              </a14:hiddenFill>
-            </a:ext>
-            <a:ext uri="{91240B29-F687-4F45-9708-019B960494DF}">
-              <a14:hiddenLine xmlns:a14="http://schemas.microsoft.com/office/drawing/2010/main" w="9525">
-                <a:solidFill>
-                  <a:schemeClr val="tx1"/>
-                </a:solidFill>
-                <a:miter lim="800000"/>
-                <a:headEnd/>
-                <a:tailEnd/>
-              </a14:hiddenLine>
-            </a:ext>
-            <a:ext uri="{AF507438-7753-43E0-B8FC-AC1667EBCBE1}">
-              <a14:hiddenEffects xmlns:a14="http://schemas.microsoft.com/office/drawing/2010/main">
-                <a:effectLst>
-                  <a:outerShdw dist="35921" dir="2700000" algn="ctr" rotWithShape="0">
-                    <a:schemeClr val="bg2"/>
-                  </a:outerShdw>
-                </a:effectLst>
-              </a14:hiddenEffects>
-            </a:ext>
-          </a:extLst>
-        </p:spPr>
-        <p:txBody>
-          <a:bodyPr anchor="ctr"/>
-          <a:lstStyle/>
-          <a:p>
-            <a:pPr>
-              <a:defRPr/>
-            </a:pPr>
-            <a:r>
-              <a:rPr lang="en-US" sz="4000" dirty="0">
-                <a:effectLst>
-                  <a:outerShdw blurRad="38100" dist="38100" dir="2700000" algn="tl">
-                    <a:srgbClr val="C0C0C0"/>
-                  </a:outerShdw>
-                </a:effectLst>
-              </a:rPr>
-              <a:t>Basis Function Expansions</a:t>
-            </a:r>
-          </a:p>
-        </p:txBody>
-      </p:sp>
-      <p:pic>
-        <p:nvPicPr>
-          <p:cNvPr id="44036" name="Picture 5"/>
-          <p:cNvPicPr>
-            <a:picLocks noChangeAspect="1" noChangeArrowheads="1"/>
-          </p:cNvPicPr>
-          <p:nvPr/>
-        </p:nvPicPr>
-        <p:blipFill>
-          <a:blip r:embed="rId2">
-            <a:extLst>
-              <a:ext uri="{28A0092B-C50C-407E-A947-70E740481C1C}">
-                <a14:useLocalDpi xmlns:a14="http://schemas.microsoft.com/office/drawing/2010/main" val="0"/>
-              </a:ext>
-            </a:extLst>
-          </a:blip>
-          <a:srcRect/>
-          <a:stretch>
-            <a:fillRect/>
-          </a:stretch>
-        </p:blipFill>
-        <p:spPr bwMode="auto">
-          <a:xfrm>
-            <a:off x="2109788" y="1125539"/>
-            <a:ext cx="8388350" cy="4886325"/>
-          </a:xfrm>
-          <a:prstGeom prst="rect">
-            <a:avLst/>
-          </a:prstGeom>
-          <a:noFill/>
-          <a:ln>
-            <a:noFill/>
-          </a:ln>
-          <a:extLst>
-            <a:ext uri="{909E8E84-426E-40DD-AFC4-6F175D3DCCD1}">
-              <a14:hiddenFill xmlns:a14="http://schemas.microsoft.com/office/drawing/2010/main">
-                <a:solidFill>
-                  <a:schemeClr val="accent1"/>
-                </a:solidFill>
-              </a14:hiddenFill>
-            </a:ext>
-            <a:ext uri="{91240B29-F687-4F45-9708-019B960494DF}">
-              <a14:hiddenLine xmlns:a14="http://schemas.microsoft.com/office/drawing/2010/main" w="9525">
-                <a:solidFill>
-                  <a:schemeClr val="tx1"/>
-                </a:solidFill>
-                <a:miter lim="800000"/>
-                <a:headEnd/>
-                <a:tailEnd/>
-              </a14:hiddenLine>
-            </a:ext>
-          </a:extLst>
-        </p:spPr>
-      </p:pic>
-      <p:sp>
-        <p:nvSpPr>
-          <p:cNvPr id="2" name="Rectangle 1"/>
-          <p:cNvSpPr/>
-          <p:nvPr/>
-        </p:nvSpPr>
-        <p:spPr>
-          <a:xfrm>
-            <a:off x="2063750" y="1700214"/>
-            <a:ext cx="8135938" cy="1152525"/>
-          </a:xfrm>
-          <a:prstGeom prst="rect">
-            <a:avLst/>
-          </a:prstGeom>
-          <a:solidFill>
-            <a:schemeClr val="bg1"/>
-          </a:solidFill>
-          <a:ln>
-            <a:noFill/>
-          </a:ln>
-        </p:spPr>
-        <p:style>
-          <a:lnRef idx="2">
-            <a:schemeClr val="accent1">
-              <a:shade val="50000"/>
-            </a:schemeClr>
-          </a:lnRef>
-          <a:fillRef idx="1">
-            <a:schemeClr val="accent1"/>
-          </a:fillRef>
-          <a:effectRef idx="0">
-            <a:schemeClr val="accent1"/>
-          </a:effectRef>
-          <a:fontRef idx="minor">
-            <a:schemeClr val="lt1"/>
-          </a:fontRef>
-        </p:style>
-        <p:txBody>
-          <a:bodyPr anchor="ctr"/>
-          <a:lstStyle/>
-          <a:p>
-            <a:pPr algn="ctr">
-              <a:defRPr/>
-            </a:pPr>
-            <a:endParaRPr lang="en-IE"/>
-          </a:p>
-        </p:txBody>
-      </p:sp>
-      <p:pic>
-        <p:nvPicPr>
-          <p:cNvPr id="43013" name="Picture 5"/>
-          <p:cNvPicPr>
-            <a:picLocks noChangeAspect="1" noChangeArrowheads="1"/>
-          </p:cNvPicPr>
-          <p:nvPr/>
-        </p:nvPicPr>
-        <p:blipFill>
-          <a:blip r:embed="rId3">
-            <a:extLst>
-              <a:ext uri="{28A0092B-C50C-407E-A947-70E740481C1C}">
-                <a14:useLocalDpi xmlns:a14="http://schemas.microsoft.com/office/drawing/2010/main" val="0"/>
-              </a:ext>
-            </a:extLst>
-          </a:blip>
-          <a:srcRect/>
-          <a:stretch>
-            <a:fillRect/>
-          </a:stretch>
-        </p:blipFill>
-        <p:spPr bwMode="auto">
-          <a:xfrm>
-            <a:off x="2060576" y="2852739"/>
-            <a:ext cx="8266113" cy="936625"/>
-          </a:xfrm>
-          <a:prstGeom prst="rect">
-            <a:avLst/>
-          </a:prstGeom>
-          <a:noFill/>
-          <a:ln>
-            <a:noFill/>
-          </a:ln>
-          <a:effectLst/>
-          <a:extLst>
-            <a:ext uri="{909E8E84-426E-40DD-AFC4-6F175D3DCCD1}">
-              <a14:hiddenFill xmlns:a14="http://schemas.microsoft.com/office/drawing/2010/main">
-                <a:solidFill>
-                  <a:schemeClr val="accent1"/>
-                </a:solidFill>
-              </a14:hiddenFill>
-            </a:ext>
-            <a:ext uri="{91240B29-F687-4F45-9708-019B960494DF}">
-              <a14:hiddenLine xmlns:a14="http://schemas.microsoft.com/office/drawing/2010/main" w="9525">
-                <a:solidFill>
-                  <a:schemeClr val="tx1"/>
-                </a:solidFill>
-                <a:miter lim="800000"/>
-                <a:headEnd/>
-                <a:tailEnd/>
-              </a14:hiddenLine>
-            </a:ext>
-            <a:ext uri="{AF507438-7753-43E0-B8FC-AC1667EBCBE1}">
-              <a14:hiddenEffects xmlns:a14="http://schemas.microsoft.com/office/drawing/2010/main">
-                <a:effectLst>
-                  <a:outerShdw dist="35921" dir="2700000" algn="ctr" rotWithShape="0">
-                    <a:schemeClr val="bg2"/>
-                  </a:outerShdw>
-                </a:effectLst>
-              </a14:hiddenEffects>
-            </a:ext>
-          </a:extLst>
-        </p:spPr>
-      </p:pic>
-      <p:sp>
-        <p:nvSpPr>
-          <p:cNvPr id="3" name="Rectangle 2"/>
-          <p:cNvSpPr/>
-          <p:nvPr/>
-        </p:nvSpPr>
-        <p:spPr>
-          <a:xfrm>
-            <a:off x="2081214" y="3644901"/>
-            <a:ext cx="6192837" cy="1800225"/>
-          </a:xfrm>
-          <a:prstGeom prst="rect">
-            <a:avLst/>
-          </a:prstGeom>
-          <a:solidFill>
-            <a:schemeClr val="bg1"/>
-          </a:solidFill>
-          <a:ln>
-            <a:noFill/>
-          </a:ln>
-        </p:spPr>
-        <p:style>
-          <a:lnRef idx="2">
-            <a:schemeClr val="accent1">
-              <a:shade val="50000"/>
-            </a:schemeClr>
-          </a:lnRef>
-          <a:fillRef idx="1">
-            <a:schemeClr val="accent1"/>
-          </a:fillRef>
-          <a:effectRef idx="0">
-            <a:schemeClr val="accent1"/>
-          </a:effectRef>
-          <a:fontRef idx="minor">
-            <a:schemeClr val="lt1"/>
-          </a:fontRef>
-        </p:style>
-        <p:txBody>
-          <a:bodyPr anchor="ctr"/>
-          <a:lstStyle/>
-          <a:p>
-            <a:pPr algn="ctr">
-              <a:defRPr/>
-            </a:pPr>
-            <a:endParaRPr lang="en-IE"/>
-          </a:p>
-        </p:txBody>
-      </p:sp>
-      <p:sp>
-        <p:nvSpPr>
-          <p:cNvPr id="5" name="Rectangle 4"/>
-          <p:cNvSpPr/>
-          <p:nvPr/>
-        </p:nvSpPr>
-        <p:spPr>
-          <a:xfrm>
-            <a:off x="2063750" y="5589589"/>
-            <a:ext cx="5111750" cy="422275"/>
-          </a:xfrm>
-          <a:prstGeom prst="rect">
-            <a:avLst/>
-          </a:prstGeom>
-          <a:solidFill>
-            <a:schemeClr val="bg1"/>
-          </a:solidFill>
-          <a:ln>
-            <a:noFill/>
-          </a:ln>
-        </p:spPr>
-        <p:style>
-          <a:lnRef idx="2">
-            <a:schemeClr val="accent1">
-              <a:shade val="50000"/>
-            </a:schemeClr>
-          </a:lnRef>
-          <a:fillRef idx="1">
-            <a:schemeClr val="accent1"/>
-          </a:fillRef>
-          <a:effectRef idx="0">
-            <a:schemeClr val="accent1"/>
-          </a:effectRef>
-          <a:fontRef idx="minor">
-            <a:schemeClr val="lt1"/>
-          </a:fontRef>
-        </p:style>
-        <p:txBody>
-          <a:bodyPr anchor="ctr"/>
-          <a:lstStyle/>
-          <a:p>
-            <a:pPr algn="ctr">
-              <a:defRPr/>
-            </a:pPr>
-            <a:endParaRPr lang="en-IE"/>
-          </a:p>
-        </p:txBody>
-      </p:sp>
-    </p:spTree>
-    <p:extLst>
-      <p:ext uri="{BB962C8B-B14F-4D97-AF65-F5344CB8AC3E}">
-        <p14:creationId xmlns:p14="http://schemas.microsoft.com/office/powerpoint/2010/main" val="1051636114"/>
       </p:ext>
     </p:extLst>
   </p:cSld>
@@ -5491,206 +5139,39 @@
               <p:cTn id="2" dur="indefinite" nodeType="mainSeq">
                 <p:childTnLst>
                   <p:par>
-                    <p:cTn id="3" fill="hold" nodeType="clickPar">
+                    <p:cTn id="3" fill="hold">
                       <p:stCondLst>
                         <p:cond delay="indefinite"/>
                       </p:stCondLst>
                       <p:childTnLst>
                         <p:par>
-                          <p:cTn id="4" fill="hold" nodeType="withGroup">
+                          <p:cTn id="4" fill="hold">
                             <p:stCondLst>
                               <p:cond delay="0"/>
                             </p:stCondLst>
                             <p:childTnLst>
                               <p:par>
-                                <p:cTn id="5" presetID="10" presetClass="exit" presetSubtype="0" fill="hold" grpId="0" nodeType="clickEffect">
+                                <p:cTn id="5" presetID="1" presetClass="entr" presetSubtype="0" fill="hold" grpId="0" nodeType="clickEffect">
                                   <p:stCondLst>
                                     <p:cond delay="0"/>
                                   </p:stCondLst>
                                   <p:childTnLst>
-                                    <p:animEffect transition="out" filter="fade">
-                                      <p:cBhvr>
-                                        <p:cTn id="6" dur="500"/>
-                                        <p:tgtEl>
-                                          <p:spTgt spid="2"/>
-                                        </p:tgtEl>
-                                      </p:cBhvr>
-                                    </p:animEffect>
                                     <p:set>
                                       <p:cBhvr>
-                                        <p:cTn id="7" dur="1" fill="hold">
+                                        <p:cTn id="6" dur="1" fill="hold">
                                           <p:stCondLst>
-                                            <p:cond delay="499"/>
+                                            <p:cond delay="0"/>
                                           </p:stCondLst>
                                         </p:cTn>
                                         <p:tgtEl>
-                                          <p:spTgt spid="2"/>
+                                          <p:spTgt spid="18"/>
                                         </p:tgtEl>
                                         <p:attrNameLst>
                                           <p:attrName>style.visibility</p:attrName>
                                         </p:attrNameLst>
                                       </p:cBhvr>
                                       <p:to>
-                                        <p:strVal val="hidden"/>
-                                      </p:to>
-                                    </p:set>
-                                  </p:childTnLst>
-                                </p:cTn>
-                              </p:par>
-                            </p:childTnLst>
-                          </p:cTn>
-                        </p:par>
-                      </p:childTnLst>
-                    </p:cTn>
-                  </p:par>
-                  <p:par>
-                    <p:cTn id="8" fill="hold" nodeType="clickPar">
-                      <p:stCondLst>
-                        <p:cond delay="indefinite"/>
-                      </p:stCondLst>
-                      <p:childTnLst>
-                        <p:par>
-                          <p:cTn id="9" fill="hold" nodeType="withGroup">
-                            <p:stCondLst>
-                              <p:cond delay="0"/>
-                            </p:stCondLst>
-                            <p:childTnLst>
-                              <p:par>
-                                <p:cTn id="10" presetID="10" presetClass="exit" presetSubtype="0" fill="hold" nodeType="clickEffect">
-                                  <p:stCondLst>
-                                    <p:cond delay="0"/>
-                                  </p:stCondLst>
-                                  <p:childTnLst>
-                                    <p:animEffect transition="out" filter="fade">
-                                      <p:cBhvr>
-                                        <p:cTn id="11" dur="500"/>
-                                        <p:tgtEl>
-                                          <p:spTgt spid="43013"/>
-                                        </p:tgtEl>
-                                      </p:cBhvr>
-                                    </p:animEffect>
-                                    <p:set>
-                                      <p:cBhvr>
-                                        <p:cTn id="12" dur="1" fill="hold">
-                                          <p:stCondLst>
-                                            <p:cond delay="499"/>
-                                          </p:stCondLst>
-                                        </p:cTn>
-                                        <p:tgtEl>
-                                          <p:spTgt spid="43013"/>
-                                        </p:tgtEl>
-                                        <p:attrNameLst>
-                                          <p:attrName>style.visibility</p:attrName>
-                                        </p:attrNameLst>
-                                      </p:cBhvr>
-                                      <p:to>
-                                        <p:strVal val="hidden"/>
-                                      </p:to>
-                                    </p:set>
-                                  </p:childTnLst>
-                                </p:cTn>
-                              </p:par>
-                            </p:childTnLst>
-                          </p:cTn>
-                        </p:par>
-                      </p:childTnLst>
-                    </p:cTn>
-                  </p:par>
-                  <p:par>
-                    <p:cTn id="13" fill="hold" nodeType="clickPar">
-                      <p:stCondLst>
-                        <p:cond delay="indefinite"/>
-                      </p:stCondLst>
-                      <p:childTnLst>
-                        <p:par>
-                          <p:cTn id="14" fill="hold" nodeType="withGroup">
-                            <p:stCondLst>
-                              <p:cond delay="0"/>
-                            </p:stCondLst>
-                            <p:childTnLst>
-                              <p:par>
-                                <p:cTn id="15" presetID="10" presetClass="exit" presetSubtype="0" fill="hold" grpId="0" nodeType="clickEffect">
-                                  <p:stCondLst>
-                                    <p:cond delay="0"/>
-                                  </p:stCondLst>
-                                  <p:childTnLst>
-                                    <p:animEffect transition="out" filter="fade">
-                                      <p:cBhvr>
-                                        <p:cTn id="16" dur="500"/>
-                                        <p:tgtEl>
-                                          <p:spTgt spid="3"/>
-                                        </p:tgtEl>
-                                      </p:cBhvr>
-                                    </p:animEffect>
-                                    <p:set>
-                                      <p:cBhvr>
-                                        <p:cTn id="17" dur="1" fill="hold">
-                                          <p:stCondLst>
-                                            <p:cond delay="499"/>
-                                          </p:stCondLst>
-                                        </p:cTn>
-                                        <p:tgtEl>
-                                          <p:spTgt spid="3"/>
-                                        </p:tgtEl>
-                                        <p:attrNameLst>
-                                          <p:attrName>style.visibility</p:attrName>
-                                        </p:attrNameLst>
-                                      </p:cBhvr>
-                                      <p:to>
-                                        <p:strVal val="hidden"/>
-                                      </p:to>
-                                    </p:set>
-                                  </p:childTnLst>
-                                </p:cTn>
-                              </p:par>
-                            </p:childTnLst>
-                          </p:cTn>
-                        </p:par>
-                      </p:childTnLst>
-                    </p:cTn>
-                  </p:par>
-                  <p:par>
-                    <p:cTn id="18" fill="hold" nodeType="clickPar">
-                      <p:stCondLst>
-                        <p:cond delay="indefinite"/>
-                      </p:stCondLst>
-                      <p:childTnLst>
-                        <p:par>
-                          <p:cTn id="19" fill="hold" nodeType="withGroup">
-                            <p:stCondLst>
-                              <p:cond delay="0"/>
-                            </p:stCondLst>
-                            <p:childTnLst>
-                              <p:par>
-                                <p:cTn id="20" presetID="10" presetClass="exit" presetSubtype="0" fill="hold" grpId="0" nodeType="clickEffect">
-                                  <p:stCondLst>
-                                    <p:cond delay="0"/>
-                                  </p:stCondLst>
-                                  <p:childTnLst>
-                                    <p:animEffect transition="out" filter="fade">
-                                      <p:cBhvr>
-                                        <p:cTn id="21" dur="500"/>
-                                        <p:tgtEl>
-                                          <p:spTgt spid="5"/>
-                                        </p:tgtEl>
-                                      </p:cBhvr>
-                                    </p:animEffect>
-                                    <p:set>
-                                      <p:cBhvr>
-                                        <p:cTn id="22" dur="1" fill="hold">
-                                          <p:stCondLst>
-                                            <p:cond delay="499"/>
-                                          </p:stCondLst>
-                                        </p:cTn>
-                                        <p:tgtEl>
-                                          <p:spTgt spid="5"/>
-                                        </p:tgtEl>
-                                        <p:attrNameLst>
-                                          <p:attrName>style.visibility</p:attrName>
-                                        </p:attrNameLst>
-                                      </p:cBhvr>
-                                      <p:to>
-                                        <p:strVal val="hidden"/>
+                                        <p:strVal val="visible"/>
                                       </p:to>
                                     </p:set>
                                   </p:childTnLst>
@@ -5724,9 +5205,2030 @@
       </p:par>
     </p:tnLst>
     <p:bldLst>
-      <p:bldP spid="2" grpId="0" animBg="1"/>
-      <p:bldP spid="3" grpId="0" animBg="1"/>
-      <p:bldP spid="5" grpId="0" animBg="1"/>
+      <p:bldP spid="18" grpId="0"/>
+    </p:bldLst>
+  </p:timing>
+</p:sld>
+</file>
+
+<file path=ppt/slides/slide3.xml><?xml version="1.0" encoding="utf-8"?>
+<p:sld xmlns:a="http://schemas.openxmlformats.org/drawingml/2006/main" xmlns:r="http://schemas.openxmlformats.org/officeDocument/2006/relationships" xmlns:p="http://schemas.openxmlformats.org/presentationml/2006/main">
+  <p:cSld>
+    <p:spTree>
+      <p:nvGrpSpPr>
+        <p:cNvPr id="1" name=""/>
+        <p:cNvGrpSpPr/>
+        <p:nvPr/>
+      </p:nvGrpSpPr>
+      <p:grpSpPr>
+        <a:xfrm>
+          <a:off x="0" y="0"/>
+          <a:ext cx="0" cy="0"/>
+          <a:chOff x="0" y="0"/>
+          <a:chExt cx="0" cy="0"/>
+        </a:xfrm>
+      </p:grpSpPr>
+      <p:sp>
+        <p:nvSpPr>
+          <p:cNvPr id="2" name="Title 1">
+            <a:extLst>
+              <a:ext uri="{FF2B5EF4-FFF2-40B4-BE49-F238E27FC236}">
+                <a16:creationId xmlns:a16="http://schemas.microsoft.com/office/drawing/2014/main" id="{7510116C-1ADA-FDA6-6F7E-360890477E0F}"/>
+              </a:ext>
+            </a:extLst>
+          </p:cNvPr>
+          <p:cNvSpPr>
+            <a:spLocks noGrp="1"/>
+          </p:cNvSpPr>
+          <p:nvPr>
+            <p:ph type="title"/>
+          </p:nvPr>
+        </p:nvSpPr>
+        <p:spPr/>
+        <p:txBody>
+          <a:bodyPr/>
+          <a:lstStyle/>
+          <a:p>
+            <a:r>
+              <a:rPr lang="en-GB" dirty="0"/>
+              <a:t>Basis Functions</a:t>
+            </a:r>
+          </a:p>
+        </p:txBody>
+      </p:sp>
+      <mc:AlternateContent xmlns:mc="http://schemas.openxmlformats.org/markup-compatibility/2006">
+        <mc:Choice xmlns:a14="http://schemas.microsoft.com/office/drawing/2010/main" Requires="a14">
+          <p:sp>
+            <p:nvSpPr>
+              <p:cNvPr id="3" name="Content Placeholder 2">
+                <a:extLst>
+                  <a:ext uri="{FF2B5EF4-FFF2-40B4-BE49-F238E27FC236}">
+                    <a16:creationId xmlns:a16="http://schemas.microsoft.com/office/drawing/2014/main" id="{F0372D8D-8985-5EC4-A2AE-DDF339570C17}"/>
+                  </a:ext>
+                </a:extLst>
+              </p:cNvPr>
+              <p:cNvSpPr>
+                <a:spLocks noGrp="1"/>
+              </p:cNvSpPr>
+              <p:nvPr>
+                <p:ph idx="1"/>
+              </p:nvPr>
+            </p:nvSpPr>
+            <p:spPr>
+              <a:xfrm>
+                <a:off x="838200" y="1524000"/>
+                <a:ext cx="10515600" cy="4652963"/>
+              </a:xfrm>
+            </p:spPr>
+            <p:txBody>
+              <a:bodyPr/>
+              <a:lstStyle/>
+              <a:p>
+                <a:r>
+                  <a:rPr lang="en-GB" dirty="0"/>
+                  <a:t>Set of </a:t>
+                </a:r>
+                <a14:m>
+                  <m:oMath xmlns:m="http://schemas.openxmlformats.org/officeDocument/2006/math">
+                    <m:r>
+                      <a:rPr lang="en-IE" b="0" i="1" smtClean="0">
+                        <a:latin typeface="Cambria Math" panose="02040503050406030204" pitchFamily="18" charset="0"/>
+                      </a:rPr>
+                      <m:t>𝐾</m:t>
+                    </m:r>
+                  </m:oMath>
+                </a14:m>
+                <a:r>
+                  <a:rPr lang="en-GB" dirty="0"/>
+                  <a:t> known functions </a:t>
+                </a:r>
+                <a14:m>
+                  <m:oMath xmlns:m="http://schemas.openxmlformats.org/officeDocument/2006/math">
+                    <m:sSub>
+                      <m:sSubPr>
+                        <m:ctrlPr>
+                          <a:rPr lang="en-IE" b="0" i="1" smtClean="0">
+                            <a:latin typeface="Cambria Math" panose="02040503050406030204" pitchFamily="18" charset="0"/>
+                          </a:rPr>
+                        </m:ctrlPr>
+                      </m:sSubPr>
+                      <m:e>
+                        <m:r>
+                          <a:rPr lang="en-IE" b="0" i="1" smtClean="0">
+                            <a:latin typeface="Cambria Math" panose="02040503050406030204" pitchFamily="18" charset="0"/>
+                          </a:rPr>
+                          <m:t>𝜙</m:t>
+                        </m:r>
+                      </m:e>
+                      <m:sub>
+                        <m:r>
+                          <a:rPr lang="en-IE" b="0" i="1" smtClean="0">
+                            <a:latin typeface="Cambria Math" panose="02040503050406030204" pitchFamily="18" charset="0"/>
+                          </a:rPr>
+                          <m:t>1</m:t>
+                        </m:r>
+                      </m:sub>
+                    </m:sSub>
+                    <m:d>
+                      <m:dPr>
+                        <m:ctrlPr>
+                          <a:rPr lang="en-IE" b="0" i="1" smtClean="0">
+                            <a:latin typeface="Cambria Math" panose="02040503050406030204" pitchFamily="18" charset="0"/>
+                          </a:rPr>
+                        </m:ctrlPr>
+                      </m:dPr>
+                      <m:e>
+                        <m:r>
+                          <a:rPr lang="en-IE" b="0" i="1" smtClean="0">
+                            <a:latin typeface="Cambria Math" panose="02040503050406030204" pitchFamily="18" charset="0"/>
+                          </a:rPr>
+                          <m:t>𝑡</m:t>
+                        </m:r>
+                      </m:e>
+                    </m:d>
+                    <m:r>
+                      <a:rPr lang="en-IE" b="0" i="1" smtClean="0">
+                        <a:latin typeface="Cambria Math" panose="02040503050406030204" pitchFamily="18" charset="0"/>
+                      </a:rPr>
+                      <m:t>, …,</m:t>
+                    </m:r>
+                    <m:sSub>
+                      <m:sSubPr>
+                        <m:ctrlPr>
+                          <a:rPr lang="en-IE" b="0" i="1" smtClean="0">
+                            <a:latin typeface="Cambria Math" panose="02040503050406030204" pitchFamily="18" charset="0"/>
+                          </a:rPr>
+                        </m:ctrlPr>
+                      </m:sSubPr>
+                      <m:e>
+                        <m:r>
+                          <a:rPr lang="en-IE" b="0" i="1" smtClean="0">
+                            <a:latin typeface="Cambria Math" panose="02040503050406030204" pitchFamily="18" charset="0"/>
+                          </a:rPr>
+                          <m:t>𝜙</m:t>
+                        </m:r>
+                      </m:e>
+                      <m:sub>
+                        <m:r>
+                          <a:rPr lang="en-IE" b="0" i="1" smtClean="0">
+                            <a:latin typeface="Cambria Math" panose="02040503050406030204" pitchFamily="18" charset="0"/>
+                          </a:rPr>
+                          <m:t>𝐾</m:t>
+                        </m:r>
+                      </m:sub>
+                    </m:sSub>
+                    <m:r>
+                      <a:rPr lang="en-IE" b="0" i="1" smtClean="0">
+                        <a:latin typeface="Cambria Math" panose="02040503050406030204" pitchFamily="18" charset="0"/>
+                      </a:rPr>
+                      <m:t>(</m:t>
+                    </m:r>
+                    <m:r>
+                      <a:rPr lang="en-IE" b="0" i="1" smtClean="0">
+                        <a:latin typeface="Cambria Math" panose="02040503050406030204" pitchFamily="18" charset="0"/>
+                      </a:rPr>
+                      <m:t>𝑡</m:t>
+                    </m:r>
+                    <m:r>
+                      <a:rPr lang="en-IE" b="0" i="1" smtClean="0">
+                        <a:latin typeface="Cambria Math" panose="02040503050406030204" pitchFamily="18" charset="0"/>
+                      </a:rPr>
+                      <m:t>)</m:t>
+                    </m:r>
+                  </m:oMath>
+                </a14:m>
+                <a:endParaRPr lang="en-GB" dirty="0"/>
+              </a:p>
+              <a:p>
+                <a:r>
+                  <a:rPr lang="en-GB" dirty="0"/>
+                  <a:t>Can use a linear combination (or “weighted sum”) of them to approximate any function to a desired degree by making </a:t>
+                </a:r>
+                <a14:m>
+                  <m:oMath xmlns:m="http://schemas.openxmlformats.org/officeDocument/2006/math">
+                    <m:r>
+                      <a:rPr lang="en-IE" b="0" i="1" smtClean="0">
+                        <a:latin typeface="Cambria Math" panose="02040503050406030204" pitchFamily="18" charset="0"/>
+                      </a:rPr>
+                      <m:t>𝐾</m:t>
+                    </m:r>
+                  </m:oMath>
+                </a14:m>
+                <a:r>
+                  <a:rPr lang="en-GB" dirty="0"/>
+                  <a:t> sufficiently large.</a:t>
+                </a:r>
+              </a:p>
+              <a:p>
+                <a:pPr marL="0" indent="0">
+                  <a:buNone/>
+                </a:pPr>
+                <a:endParaRPr lang="en-GB" dirty="0"/>
+              </a:p>
+            </p:txBody>
+          </p:sp>
+        </mc:Choice>
+        <mc:Fallback>
+          <p:sp>
+            <p:nvSpPr>
+              <p:cNvPr id="3" name="Content Placeholder 2">
+                <a:extLst>
+                  <a:ext uri="{FF2B5EF4-FFF2-40B4-BE49-F238E27FC236}">
+                    <a16:creationId xmlns:a16="http://schemas.microsoft.com/office/drawing/2014/main" id="{F0372D8D-8985-5EC4-A2AE-DDF339570C17}"/>
+                  </a:ext>
+                </a:extLst>
+              </p:cNvPr>
+              <p:cNvSpPr>
+                <a:spLocks noGrp="1" noRot="1" noChangeAspect="1" noMove="1" noResize="1" noEditPoints="1" noAdjustHandles="1" noChangeArrowheads="1" noChangeShapeType="1" noTextEdit="1"/>
+              </p:cNvSpPr>
+              <p:nvPr>
+                <p:ph idx="1"/>
+              </p:nvPr>
+            </p:nvSpPr>
+            <p:spPr>
+              <a:xfrm>
+                <a:off x="838200" y="1524000"/>
+                <a:ext cx="10515600" cy="4652963"/>
+              </a:xfrm>
+              <a:blipFill>
+                <a:blip r:embed="rId2"/>
+                <a:stretch>
+                  <a:fillRect l="-1086" t="-2452"/>
+                </a:stretch>
+              </a:blipFill>
+            </p:spPr>
+            <p:txBody>
+              <a:bodyPr/>
+              <a:lstStyle/>
+              <a:p>
+                <a:r>
+                  <a:rPr lang="en-GB">
+                    <a:noFill/>
+                  </a:rPr>
+                  <a:t> </a:t>
+                </a:r>
+              </a:p>
+            </p:txBody>
+          </p:sp>
+        </mc:Fallback>
+      </mc:AlternateContent>
+      <p:pic>
+        <p:nvPicPr>
+          <p:cNvPr id="5" name="Picture 4">
+            <a:extLst>
+              <a:ext uri="{FF2B5EF4-FFF2-40B4-BE49-F238E27FC236}">
+                <a16:creationId xmlns:a16="http://schemas.microsoft.com/office/drawing/2014/main" id="{CFD42447-C84C-D4E4-4383-A82E3DF7D691}"/>
+              </a:ext>
+            </a:extLst>
+          </p:cNvPr>
+          <p:cNvPicPr>
+            <a:picLocks noChangeAspect="1"/>
+          </p:cNvPicPr>
+          <p:nvPr/>
+        </p:nvPicPr>
+        <p:blipFill>
+          <a:blip r:embed="rId3"/>
+          <a:stretch>
+            <a:fillRect/>
+          </a:stretch>
+        </p:blipFill>
+        <p:spPr>
+          <a:xfrm>
+            <a:off x="2534125" y="3276600"/>
+            <a:ext cx="7123749" cy="3397250"/>
+          </a:xfrm>
+          <a:prstGeom prst="rect">
+            <a:avLst/>
+          </a:prstGeom>
+        </p:spPr>
+      </p:pic>
+    </p:spTree>
+    <p:extLst>
+      <p:ext uri="{BB962C8B-B14F-4D97-AF65-F5344CB8AC3E}">
+        <p14:creationId xmlns:p14="http://schemas.microsoft.com/office/powerpoint/2010/main" val="396589393"/>
+      </p:ext>
+    </p:extLst>
+  </p:cSld>
+  <p:clrMapOvr>
+    <a:masterClrMapping/>
+  </p:clrMapOvr>
+  <p:timing>
+    <p:tnLst>
+      <p:par>
+        <p:cTn id="1" dur="indefinite" restart="never" nodeType="tmRoot">
+          <p:childTnLst>
+            <p:seq concurrent="1" nextAc="seek">
+              <p:cTn id="2" dur="indefinite" nodeType="mainSeq">
+                <p:childTnLst>
+                  <p:par>
+                    <p:cTn id="3" fill="hold">
+                      <p:stCondLst>
+                        <p:cond delay="indefinite"/>
+                      </p:stCondLst>
+                      <p:childTnLst>
+                        <p:par>
+                          <p:cTn id="4" fill="hold">
+                            <p:stCondLst>
+                              <p:cond delay="0"/>
+                            </p:stCondLst>
+                            <p:childTnLst>
+                              <p:par>
+                                <p:cTn id="5" presetID="1" presetClass="entr" presetSubtype="0" fill="hold" nodeType="clickEffect">
+                                  <p:stCondLst>
+                                    <p:cond delay="0"/>
+                                  </p:stCondLst>
+                                  <p:childTnLst>
+                                    <p:set>
+                                      <p:cBhvr>
+                                        <p:cTn id="6" dur="1" fill="hold">
+                                          <p:stCondLst>
+                                            <p:cond delay="0"/>
+                                          </p:stCondLst>
+                                        </p:cTn>
+                                        <p:tgtEl>
+                                          <p:spTgt spid="3">
+                                            <p:txEl>
+                                              <p:pRg st="0" end="0"/>
+                                            </p:txEl>
+                                          </p:spTgt>
+                                        </p:tgtEl>
+                                        <p:attrNameLst>
+                                          <p:attrName>style.visibility</p:attrName>
+                                        </p:attrNameLst>
+                                      </p:cBhvr>
+                                      <p:to>
+                                        <p:strVal val="visible"/>
+                                      </p:to>
+                                    </p:set>
+                                  </p:childTnLst>
+                                </p:cTn>
+                              </p:par>
+                            </p:childTnLst>
+                          </p:cTn>
+                        </p:par>
+                      </p:childTnLst>
+                    </p:cTn>
+                  </p:par>
+                  <p:par>
+                    <p:cTn id="7" fill="hold">
+                      <p:stCondLst>
+                        <p:cond delay="indefinite"/>
+                      </p:stCondLst>
+                      <p:childTnLst>
+                        <p:par>
+                          <p:cTn id="8" fill="hold">
+                            <p:stCondLst>
+                              <p:cond delay="0"/>
+                            </p:stCondLst>
+                            <p:childTnLst>
+                              <p:par>
+                                <p:cTn id="9" presetID="1" presetClass="entr" presetSubtype="0" fill="hold" nodeType="clickEffect">
+                                  <p:stCondLst>
+                                    <p:cond delay="0"/>
+                                  </p:stCondLst>
+                                  <p:childTnLst>
+                                    <p:set>
+                                      <p:cBhvr>
+                                        <p:cTn id="10" dur="1" fill="hold">
+                                          <p:stCondLst>
+                                            <p:cond delay="0"/>
+                                          </p:stCondLst>
+                                        </p:cTn>
+                                        <p:tgtEl>
+                                          <p:spTgt spid="3">
+                                            <p:txEl>
+                                              <p:pRg st="1" end="1"/>
+                                            </p:txEl>
+                                          </p:spTgt>
+                                        </p:tgtEl>
+                                        <p:attrNameLst>
+                                          <p:attrName>style.visibility</p:attrName>
+                                        </p:attrNameLst>
+                                      </p:cBhvr>
+                                      <p:to>
+                                        <p:strVal val="visible"/>
+                                      </p:to>
+                                    </p:set>
+                                  </p:childTnLst>
+                                </p:cTn>
+                              </p:par>
+                            </p:childTnLst>
+                          </p:cTn>
+                        </p:par>
+                      </p:childTnLst>
+                    </p:cTn>
+                  </p:par>
+                  <p:par>
+                    <p:cTn id="11" fill="hold">
+                      <p:stCondLst>
+                        <p:cond delay="indefinite"/>
+                      </p:stCondLst>
+                      <p:childTnLst>
+                        <p:par>
+                          <p:cTn id="12" fill="hold">
+                            <p:stCondLst>
+                              <p:cond delay="0"/>
+                            </p:stCondLst>
+                            <p:childTnLst>
+                              <p:par>
+                                <p:cTn id="13" presetID="1" presetClass="entr" presetSubtype="0" fill="hold" nodeType="clickEffect">
+                                  <p:stCondLst>
+                                    <p:cond delay="0"/>
+                                  </p:stCondLst>
+                                  <p:childTnLst>
+                                    <p:set>
+                                      <p:cBhvr>
+                                        <p:cTn id="14" dur="1" fill="hold">
+                                          <p:stCondLst>
+                                            <p:cond delay="0"/>
+                                          </p:stCondLst>
+                                        </p:cTn>
+                                        <p:tgtEl>
+                                          <p:spTgt spid="5"/>
+                                        </p:tgtEl>
+                                        <p:attrNameLst>
+                                          <p:attrName>style.visibility</p:attrName>
+                                        </p:attrNameLst>
+                                      </p:cBhvr>
+                                      <p:to>
+                                        <p:strVal val="visible"/>
+                                      </p:to>
+                                    </p:set>
+                                  </p:childTnLst>
+                                </p:cTn>
+                              </p:par>
+                            </p:childTnLst>
+                          </p:cTn>
+                        </p:par>
+                      </p:childTnLst>
+                    </p:cTn>
+                  </p:par>
+                </p:childTnLst>
+              </p:cTn>
+              <p:prevCondLst>
+                <p:cond evt="onPrev" delay="0">
+                  <p:tgtEl>
+                    <p:sldTgt/>
+                  </p:tgtEl>
+                </p:cond>
+              </p:prevCondLst>
+              <p:nextCondLst>
+                <p:cond evt="onNext" delay="0">
+                  <p:tgtEl>
+                    <p:sldTgt/>
+                  </p:tgtEl>
+                </p:cond>
+              </p:nextCondLst>
+            </p:seq>
+          </p:childTnLst>
+        </p:cTn>
+      </p:par>
+    </p:tnLst>
+  </p:timing>
+</p:sld>
+</file>
+
+<file path=ppt/slides/slide4.xml><?xml version="1.0" encoding="utf-8"?>
+<p:sld xmlns:a="http://schemas.openxmlformats.org/drawingml/2006/main" xmlns:r="http://schemas.openxmlformats.org/officeDocument/2006/relationships" xmlns:p="http://schemas.openxmlformats.org/presentationml/2006/main">
+  <p:cSld>
+    <p:spTree>
+      <p:nvGrpSpPr>
+        <p:cNvPr id="1" name=""/>
+        <p:cNvGrpSpPr/>
+        <p:nvPr/>
+      </p:nvGrpSpPr>
+      <p:grpSpPr>
+        <a:xfrm>
+          <a:off x="0" y="0"/>
+          <a:ext cx="0" cy="0"/>
+          <a:chOff x="0" y="0"/>
+          <a:chExt cx="0" cy="0"/>
+        </a:xfrm>
+      </p:grpSpPr>
+      <p:sp>
+        <p:nvSpPr>
+          <p:cNvPr id="2" name="Title 1">
+            <a:extLst>
+              <a:ext uri="{FF2B5EF4-FFF2-40B4-BE49-F238E27FC236}">
+                <a16:creationId xmlns:a16="http://schemas.microsoft.com/office/drawing/2014/main" id="{7510116C-1ADA-FDA6-6F7E-360890477E0F}"/>
+              </a:ext>
+            </a:extLst>
+          </p:cNvPr>
+          <p:cNvSpPr>
+            <a:spLocks noGrp="1"/>
+          </p:cNvSpPr>
+          <p:nvPr>
+            <p:ph type="title"/>
+          </p:nvPr>
+        </p:nvSpPr>
+        <p:spPr/>
+        <p:txBody>
+          <a:bodyPr/>
+          <a:lstStyle/>
+          <a:p>
+            <a:r>
+              <a:rPr lang="en-GB" dirty="0"/>
+              <a:t>Basis Functions</a:t>
+            </a:r>
+          </a:p>
+        </p:txBody>
+      </p:sp>
+      <mc:AlternateContent xmlns:mc="http://schemas.openxmlformats.org/markup-compatibility/2006">
+        <mc:Choice xmlns:a14="http://schemas.microsoft.com/office/drawing/2010/main" Requires="a14">
+          <p:sp>
+            <p:nvSpPr>
+              <p:cNvPr id="3" name="Content Placeholder 2">
+                <a:extLst>
+                  <a:ext uri="{FF2B5EF4-FFF2-40B4-BE49-F238E27FC236}">
+                    <a16:creationId xmlns:a16="http://schemas.microsoft.com/office/drawing/2014/main" id="{F0372D8D-8985-5EC4-A2AE-DDF339570C17}"/>
+                  </a:ext>
+                </a:extLst>
+              </p:cNvPr>
+              <p:cNvSpPr>
+                <a:spLocks noGrp="1"/>
+              </p:cNvSpPr>
+              <p:nvPr>
+                <p:ph idx="1"/>
+              </p:nvPr>
+            </p:nvSpPr>
+            <p:spPr>
+              <a:xfrm>
+                <a:off x="838200" y="1524000"/>
+                <a:ext cx="10515600" cy="4652963"/>
+              </a:xfrm>
+            </p:spPr>
+            <p:txBody>
+              <a:bodyPr/>
+              <a:lstStyle/>
+              <a:p>
+                <a:r>
+                  <a:rPr lang="en-GB" dirty="0"/>
+                  <a:t>Set of </a:t>
+                </a:r>
+                <a14:m>
+                  <m:oMath xmlns:m="http://schemas.openxmlformats.org/officeDocument/2006/math">
+                    <m:r>
+                      <a:rPr lang="en-IE" b="0" i="1" smtClean="0">
+                        <a:latin typeface="Cambria Math" panose="02040503050406030204" pitchFamily="18" charset="0"/>
+                      </a:rPr>
+                      <m:t>𝐾</m:t>
+                    </m:r>
+                  </m:oMath>
+                </a14:m>
+                <a:r>
+                  <a:rPr lang="en-GB" dirty="0"/>
+                  <a:t> known functions </a:t>
+                </a:r>
+                <a14:m>
+                  <m:oMath xmlns:m="http://schemas.openxmlformats.org/officeDocument/2006/math">
+                    <m:sSub>
+                      <m:sSubPr>
+                        <m:ctrlPr>
+                          <a:rPr lang="en-IE" b="0" i="1" smtClean="0">
+                            <a:latin typeface="Cambria Math" panose="02040503050406030204" pitchFamily="18" charset="0"/>
+                          </a:rPr>
+                        </m:ctrlPr>
+                      </m:sSubPr>
+                      <m:e>
+                        <m:r>
+                          <a:rPr lang="en-IE" b="0" i="1" smtClean="0">
+                            <a:latin typeface="Cambria Math" panose="02040503050406030204" pitchFamily="18" charset="0"/>
+                          </a:rPr>
+                          <m:t>𝜙</m:t>
+                        </m:r>
+                      </m:e>
+                      <m:sub>
+                        <m:r>
+                          <a:rPr lang="en-IE" b="0" i="1" smtClean="0">
+                            <a:latin typeface="Cambria Math" panose="02040503050406030204" pitchFamily="18" charset="0"/>
+                          </a:rPr>
+                          <m:t>1</m:t>
+                        </m:r>
+                      </m:sub>
+                    </m:sSub>
+                    <m:d>
+                      <m:dPr>
+                        <m:ctrlPr>
+                          <a:rPr lang="en-IE" b="0" i="1" smtClean="0">
+                            <a:latin typeface="Cambria Math" panose="02040503050406030204" pitchFamily="18" charset="0"/>
+                          </a:rPr>
+                        </m:ctrlPr>
+                      </m:dPr>
+                      <m:e>
+                        <m:r>
+                          <a:rPr lang="en-IE" b="0" i="1" smtClean="0">
+                            <a:latin typeface="Cambria Math" panose="02040503050406030204" pitchFamily="18" charset="0"/>
+                          </a:rPr>
+                          <m:t>𝑡</m:t>
+                        </m:r>
+                      </m:e>
+                    </m:d>
+                    <m:r>
+                      <a:rPr lang="en-IE" b="0" i="1" smtClean="0">
+                        <a:latin typeface="Cambria Math" panose="02040503050406030204" pitchFamily="18" charset="0"/>
+                      </a:rPr>
+                      <m:t>, …,</m:t>
+                    </m:r>
+                    <m:sSub>
+                      <m:sSubPr>
+                        <m:ctrlPr>
+                          <a:rPr lang="en-IE" b="0" i="1" smtClean="0">
+                            <a:latin typeface="Cambria Math" panose="02040503050406030204" pitchFamily="18" charset="0"/>
+                          </a:rPr>
+                        </m:ctrlPr>
+                      </m:sSubPr>
+                      <m:e>
+                        <m:r>
+                          <a:rPr lang="en-IE" b="0" i="1" smtClean="0">
+                            <a:latin typeface="Cambria Math" panose="02040503050406030204" pitchFamily="18" charset="0"/>
+                          </a:rPr>
+                          <m:t>𝜙</m:t>
+                        </m:r>
+                      </m:e>
+                      <m:sub>
+                        <m:r>
+                          <a:rPr lang="en-IE" b="0" i="1" smtClean="0">
+                            <a:latin typeface="Cambria Math" panose="02040503050406030204" pitchFamily="18" charset="0"/>
+                          </a:rPr>
+                          <m:t>𝐾</m:t>
+                        </m:r>
+                      </m:sub>
+                    </m:sSub>
+                    <m:r>
+                      <a:rPr lang="en-IE" b="0" i="1" smtClean="0">
+                        <a:latin typeface="Cambria Math" panose="02040503050406030204" pitchFamily="18" charset="0"/>
+                      </a:rPr>
+                      <m:t>(</m:t>
+                    </m:r>
+                    <m:r>
+                      <a:rPr lang="en-IE" b="0" i="1" smtClean="0">
+                        <a:latin typeface="Cambria Math" panose="02040503050406030204" pitchFamily="18" charset="0"/>
+                      </a:rPr>
+                      <m:t>𝑡</m:t>
+                    </m:r>
+                    <m:r>
+                      <a:rPr lang="en-IE" b="0" i="1" smtClean="0">
+                        <a:latin typeface="Cambria Math" panose="02040503050406030204" pitchFamily="18" charset="0"/>
+                      </a:rPr>
+                      <m:t>)</m:t>
+                    </m:r>
+                  </m:oMath>
+                </a14:m>
+                <a:endParaRPr lang="en-GB" dirty="0"/>
+              </a:p>
+              <a:p>
+                <a:r>
+                  <a:rPr lang="en-GB" dirty="0"/>
+                  <a:t>Can use a linear combination (or “weighted sum”) of them to approximate any function to a desired degree by making </a:t>
+                </a:r>
+                <a14:m>
+                  <m:oMath xmlns:m="http://schemas.openxmlformats.org/officeDocument/2006/math">
+                    <m:r>
+                      <a:rPr lang="en-IE" b="0" i="1" smtClean="0">
+                        <a:latin typeface="Cambria Math" panose="02040503050406030204" pitchFamily="18" charset="0"/>
+                      </a:rPr>
+                      <m:t>𝐾</m:t>
+                    </m:r>
+                  </m:oMath>
+                </a14:m>
+                <a:r>
+                  <a:rPr lang="en-GB" dirty="0"/>
+                  <a:t> sufficiently large.</a:t>
+                </a:r>
+              </a:p>
+              <a:p>
+                <a:r>
+                  <a:rPr lang="en-GB" dirty="0"/>
+                  <a:t>Different bases suit different data types:</a:t>
+                </a:r>
+              </a:p>
+              <a:p>
+                <a:pPr lvl="1"/>
+                <a:r>
+                  <a:rPr lang="en-GB" dirty="0"/>
+                  <a:t>Periodic/ cyclical movements (e.g., gait) = </a:t>
+                </a:r>
+                <a:r>
+                  <a:rPr lang="en-GB" b="1" dirty="0"/>
+                  <a:t>Fourier</a:t>
+                </a:r>
+              </a:p>
+              <a:p>
+                <a:pPr lvl="1"/>
+                <a:r>
+                  <a:rPr lang="en-GB" dirty="0"/>
+                  <a:t>General smooth functions = </a:t>
+                </a:r>
+                <a:r>
+                  <a:rPr lang="en-GB" b="1" dirty="0"/>
+                  <a:t>B-spline</a:t>
+                </a:r>
+                <a:r>
+                  <a:rPr lang="en-GB" dirty="0"/>
+                  <a:t> (good “all-rounder”)</a:t>
+                </a:r>
+              </a:p>
+              <a:p>
+                <a:pPr lvl="1"/>
+                <a:r>
+                  <a:rPr lang="en-GB" dirty="0"/>
+                  <a:t>Spiky/ non-smooth functions (e.g., EMG, EEG, ECG) = </a:t>
+                </a:r>
+                <a:r>
+                  <a:rPr lang="en-GB" b="1" dirty="0"/>
+                  <a:t>wavelets</a:t>
+                </a:r>
+              </a:p>
+              <a:p>
+                <a:pPr marL="0" indent="0">
+                  <a:buNone/>
+                </a:pPr>
+                <a:endParaRPr lang="en-GB" dirty="0"/>
+              </a:p>
+            </p:txBody>
+          </p:sp>
+        </mc:Choice>
+        <mc:Fallback>
+          <p:sp>
+            <p:nvSpPr>
+              <p:cNvPr id="3" name="Content Placeholder 2">
+                <a:extLst>
+                  <a:ext uri="{FF2B5EF4-FFF2-40B4-BE49-F238E27FC236}">
+                    <a16:creationId xmlns:a16="http://schemas.microsoft.com/office/drawing/2014/main" id="{F0372D8D-8985-5EC4-A2AE-DDF339570C17}"/>
+                  </a:ext>
+                </a:extLst>
+              </p:cNvPr>
+              <p:cNvSpPr>
+                <a:spLocks noGrp="1" noRot="1" noChangeAspect="1" noMove="1" noResize="1" noEditPoints="1" noAdjustHandles="1" noChangeArrowheads="1" noChangeShapeType="1" noTextEdit="1"/>
+              </p:cNvSpPr>
+              <p:nvPr>
+                <p:ph idx="1"/>
+              </p:nvPr>
+            </p:nvSpPr>
+            <p:spPr>
+              <a:xfrm>
+                <a:off x="838200" y="1524000"/>
+                <a:ext cx="10515600" cy="4652963"/>
+              </a:xfrm>
+              <a:blipFill>
+                <a:blip r:embed="rId2"/>
+                <a:stretch>
+                  <a:fillRect l="-1086" t="-2452"/>
+                </a:stretch>
+              </a:blipFill>
+            </p:spPr>
+            <p:txBody>
+              <a:bodyPr/>
+              <a:lstStyle/>
+              <a:p>
+                <a:r>
+                  <a:rPr lang="en-GB">
+                    <a:noFill/>
+                  </a:rPr>
+                  <a:t> </a:t>
+                </a:r>
+              </a:p>
+            </p:txBody>
+          </p:sp>
+        </mc:Fallback>
+      </mc:AlternateContent>
+    </p:spTree>
+    <p:extLst>
+      <p:ext uri="{BB962C8B-B14F-4D97-AF65-F5344CB8AC3E}">
+        <p14:creationId xmlns:p14="http://schemas.microsoft.com/office/powerpoint/2010/main" val="2437817968"/>
+      </p:ext>
+    </p:extLst>
+  </p:cSld>
+  <p:clrMapOvr>
+    <a:masterClrMapping/>
+  </p:clrMapOvr>
+  <p:timing>
+    <p:tnLst>
+      <p:par>
+        <p:cTn id="1" dur="indefinite" restart="never" nodeType="tmRoot">
+          <p:childTnLst>
+            <p:seq concurrent="1" nextAc="seek">
+              <p:cTn id="2" dur="indefinite" nodeType="mainSeq">
+                <p:childTnLst>
+                  <p:par>
+                    <p:cTn id="3" fill="hold">
+                      <p:stCondLst>
+                        <p:cond delay="indefinite"/>
+                      </p:stCondLst>
+                      <p:childTnLst>
+                        <p:par>
+                          <p:cTn id="4" fill="hold">
+                            <p:stCondLst>
+                              <p:cond delay="0"/>
+                            </p:stCondLst>
+                            <p:childTnLst>
+                              <p:par>
+                                <p:cTn id="5" presetID="1" presetClass="entr" presetSubtype="0" fill="hold" nodeType="clickEffect">
+                                  <p:stCondLst>
+                                    <p:cond delay="0"/>
+                                  </p:stCondLst>
+                                  <p:childTnLst>
+                                    <p:set>
+                                      <p:cBhvr>
+                                        <p:cTn id="6" dur="1" fill="hold">
+                                          <p:stCondLst>
+                                            <p:cond delay="0"/>
+                                          </p:stCondLst>
+                                        </p:cTn>
+                                        <p:tgtEl>
+                                          <p:spTgt spid="3">
+                                            <p:txEl>
+                                              <p:pRg st="2" end="2"/>
+                                            </p:txEl>
+                                          </p:spTgt>
+                                        </p:tgtEl>
+                                        <p:attrNameLst>
+                                          <p:attrName>style.visibility</p:attrName>
+                                        </p:attrNameLst>
+                                      </p:cBhvr>
+                                      <p:to>
+                                        <p:strVal val="visible"/>
+                                      </p:to>
+                                    </p:set>
+                                  </p:childTnLst>
+                                </p:cTn>
+                              </p:par>
+                              <p:par>
+                                <p:cTn id="7" presetID="1" presetClass="entr" presetSubtype="0" fill="hold" nodeType="withEffect">
+                                  <p:stCondLst>
+                                    <p:cond delay="0"/>
+                                  </p:stCondLst>
+                                  <p:childTnLst>
+                                    <p:set>
+                                      <p:cBhvr>
+                                        <p:cTn id="8" dur="1" fill="hold">
+                                          <p:stCondLst>
+                                            <p:cond delay="0"/>
+                                          </p:stCondLst>
+                                        </p:cTn>
+                                        <p:tgtEl>
+                                          <p:spTgt spid="3">
+                                            <p:txEl>
+                                              <p:pRg st="3" end="3"/>
+                                            </p:txEl>
+                                          </p:spTgt>
+                                        </p:tgtEl>
+                                        <p:attrNameLst>
+                                          <p:attrName>style.visibility</p:attrName>
+                                        </p:attrNameLst>
+                                      </p:cBhvr>
+                                      <p:to>
+                                        <p:strVal val="visible"/>
+                                      </p:to>
+                                    </p:set>
+                                  </p:childTnLst>
+                                </p:cTn>
+                              </p:par>
+                              <p:par>
+                                <p:cTn id="9" presetID="1" presetClass="entr" presetSubtype="0" fill="hold" nodeType="withEffect">
+                                  <p:stCondLst>
+                                    <p:cond delay="0"/>
+                                  </p:stCondLst>
+                                  <p:childTnLst>
+                                    <p:set>
+                                      <p:cBhvr>
+                                        <p:cTn id="10" dur="1" fill="hold">
+                                          <p:stCondLst>
+                                            <p:cond delay="0"/>
+                                          </p:stCondLst>
+                                        </p:cTn>
+                                        <p:tgtEl>
+                                          <p:spTgt spid="3">
+                                            <p:txEl>
+                                              <p:pRg st="4" end="4"/>
+                                            </p:txEl>
+                                          </p:spTgt>
+                                        </p:tgtEl>
+                                        <p:attrNameLst>
+                                          <p:attrName>style.visibility</p:attrName>
+                                        </p:attrNameLst>
+                                      </p:cBhvr>
+                                      <p:to>
+                                        <p:strVal val="visible"/>
+                                      </p:to>
+                                    </p:set>
+                                  </p:childTnLst>
+                                </p:cTn>
+                              </p:par>
+                              <p:par>
+                                <p:cTn id="11" presetID="1" presetClass="entr" presetSubtype="0" fill="hold" nodeType="withEffect">
+                                  <p:stCondLst>
+                                    <p:cond delay="0"/>
+                                  </p:stCondLst>
+                                  <p:childTnLst>
+                                    <p:set>
+                                      <p:cBhvr>
+                                        <p:cTn id="12" dur="1" fill="hold">
+                                          <p:stCondLst>
+                                            <p:cond delay="0"/>
+                                          </p:stCondLst>
+                                        </p:cTn>
+                                        <p:tgtEl>
+                                          <p:spTgt spid="3">
+                                            <p:txEl>
+                                              <p:pRg st="5" end="5"/>
+                                            </p:txEl>
+                                          </p:spTgt>
+                                        </p:tgtEl>
+                                        <p:attrNameLst>
+                                          <p:attrName>style.visibility</p:attrName>
+                                        </p:attrNameLst>
+                                      </p:cBhvr>
+                                      <p:to>
+                                        <p:strVal val="visible"/>
+                                      </p:to>
+                                    </p:set>
+                                  </p:childTnLst>
+                                </p:cTn>
+                              </p:par>
+                            </p:childTnLst>
+                          </p:cTn>
+                        </p:par>
+                      </p:childTnLst>
+                    </p:cTn>
+                  </p:par>
+                </p:childTnLst>
+              </p:cTn>
+              <p:prevCondLst>
+                <p:cond evt="onPrev" delay="0">
+                  <p:tgtEl>
+                    <p:sldTgt/>
+                  </p:tgtEl>
+                </p:cond>
+              </p:prevCondLst>
+              <p:nextCondLst>
+                <p:cond evt="onNext" delay="0">
+                  <p:tgtEl>
+                    <p:sldTgt/>
+                  </p:tgtEl>
+                </p:cond>
+              </p:nextCondLst>
+            </p:seq>
+          </p:childTnLst>
+        </p:cTn>
+      </p:par>
+    </p:tnLst>
+  </p:timing>
+</p:sld>
+</file>
+
+<file path=ppt/slides/slide5.xml><?xml version="1.0" encoding="utf-8"?>
+<p:sld xmlns:a="http://schemas.openxmlformats.org/drawingml/2006/main" xmlns:r="http://schemas.openxmlformats.org/officeDocument/2006/relationships" xmlns:p="http://schemas.openxmlformats.org/presentationml/2006/main">
+  <p:cSld>
+    <p:spTree>
+      <p:nvGrpSpPr>
+        <p:cNvPr id="1" name=""/>
+        <p:cNvGrpSpPr/>
+        <p:nvPr/>
+      </p:nvGrpSpPr>
+      <p:grpSpPr>
+        <a:xfrm>
+          <a:off x="0" y="0"/>
+          <a:ext cx="0" cy="0"/>
+          <a:chOff x="0" y="0"/>
+          <a:chExt cx="0" cy="0"/>
+        </a:xfrm>
+      </p:grpSpPr>
+      <p:pic>
+        <p:nvPicPr>
+          <p:cNvPr id="13" name="Picture 12">
+            <a:extLst>
+              <a:ext uri="{FF2B5EF4-FFF2-40B4-BE49-F238E27FC236}">
+                <a16:creationId xmlns:a16="http://schemas.microsoft.com/office/drawing/2014/main" id="{258E99CE-CE63-2F9B-E913-71DF398A0205}"/>
+              </a:ext>
+            </a:extLst>
+          </p:cNvPr>
+          <p:cNvPicPr>
+            <a:picLocks noChangeAspect="1"/>
+          </p:cNvPicPr>
+          <p:nvPr/>
+        </p:nvPicPr>
+        <p:blipFill>
+          <a:blip r:embed="rId2"/>
+          <a:stretch>
+            <a:fillRect/>
+          </a:stretch>
+        </p:blipFill>
+        <p:spPr>
+          <a:xfrm>
+            <a:off x="2921000" y="3524250"/>
+            <a:ext cx="6667500" cy="3333750"/>
+          </a:xfrm>
+          <a:prstGeom prst="rect">
+            <a:avLst/>
+          </a:prstGeom>
+        </p:spPr>
+      </p:pic>
+      <p:sp>
+        <p:nvSpPr>
+          <p:cNvPr id="2" name="Title 1">
+            <a:extLst>
+              <a:ext uri="{FF2B5EF4-FFF2-40B4-BE49-F238E27FC236}">
+                <a16:creationId xmlns:a16="http://schemas.microsoft.com/office/drawing/2014/main" id="{5AB40E93-880D-478C-BAED-33EDCF726601}"/>
+              </a:ext>
+            </a:extLst>
+          </p:cNvPr>
+          <p:cNvSpPr>
+            <a:spLocks noGrp="1"/>
+          </p:cNvSpPr>
+          <p:nvPr>
+            <p:ph type="title"/>
+          </p:nvPr>
+        </p:nvSpPr>
+        <p:spPr/>
+        <p:txBody>
+          <a:bodyPr/>
+          <a:lstStyle/>
+          <a:p>
+            <a:r>
+              <a:rPr lang="en-GB" dirty="0"/>
+              <a:t>Basis Functions</a:t>
+            </a:r>
+          </a:p>
+        </p:txBody>
+      </p:sp>
+      <mc:AlternateContent xmlns:mc="http://schemas.openxmlformats.org/markup-compatibility/2006">
+        <mc:Choice xmlns:a14="http://schemas.microsoft.com/office/drawing/2010/main" Requires="a14">
+          <p:sp>
+            <p:nvSpPr>
+              <p:cNvPr id="3" name="Content Placeholder 2">
+                <a:extLst>
+                  <a:ext uri="{FF2B5EF4-FFF2-40B4-BE49-F238E27FC236}">
+                    <a16:creationId xmlns:a16="http://schemas.microsoft.com/office/drawing/2014/main" id="{3E745B99-FFFC-2526-1DAC-D42BC20CC6AE}"/>
+                  </a:ext>
+                </a:extLst>
+              </p:cNvPr>
+              <p:cNvSpPr>
+                <a:spLocks noGrp="1"/>
+              </p:cNvSpPr>
+              <p:nvPr>
+                <p:ph idx="1"/>
+              </p:nvPr>
+            </p:nvSpPr>
+            <p:spPr/>
+            <p:txBody>
+              <a:bodyPr/>
+              <a:lstStyle/>
+              <a:p>
+                <a:pPr marL="0" indent="0">
+                  <a:buNone/>
+                </a:pPr>
+                <a:r>
+                  <a:rPr lang="en-GB" dirty="0"/>
+                  <a:t>Express smooth function as the weighted sum</a:t>
+                </a:r>
+              </a:p>
+              <a:p>
+                <a:pPr marL="0" indent="0">
+                  <a:buNone/>
+                </a:pPr>
+                <a14:m>
+                  <m:oMathPara xmlns:m="http://schemas.openxmlformats.org/officeDocument/2006/math">
+                    <m:oMathParaPr>
+                      <m:jc m:val="centerGroup"/>
+                    </m:oMathParaPr>
+                    <m:oMath xmlns:m="http://schemas.openxmlformats.org/officeDocument/2006/math">
+                      <m:r>
+                        <a:rPr lang="en-IE" b="0" i="1" smtClean="0">
+                          <a:latin typeface="Cambria Math" panose="02040503050406030204" pitchFamily="18" charset="0"/>
+                        </a:rPr>
+                        <m:t>𝑥</m:t>
+                      </m:r>
+                      <m:d>
+                        <m:dPr>
+                          <m:ctrlPr>
+                            <a:rPr lang="en-IE" b="0" i="1" smtClean="0">
+                              <a:latin typeface="Cambria Math" panose="02040503050406030204" pitchFamily="18" charset="0"/>
+                            </a:rPr>
+                          </m:ctrlPr>
+                        </m:dPr>
+                        <m:e>
+                          <m:r>
+                            <a:rPr lang="en-IE" b="0" i="1" smtClean="0">
+                              <a:latin typeface="Cambria Math" panose="02040503050406030204" pitchFamily="18" charset="0"/>
+                            </a:rPr>
+                            <m:t>𝑡</m:t>
+                          </m:r>
+                        </m:e>
+                      </m:d>
+                      <m:r>
+                        <a:rPr lang="en-IE" b="0" i="1" smtClean="0">
+                          <a:latin typeface="Cambria Math" panose="02040503050406030204" pitchFamily="18" charset="0"/>
+                        </a:rPr>
+                        <m:t>=</m:t>
+                      </m:r>
+                      <m:nary>
+                        <m:naryPr>
+                          <m:chr m:val="∑"/>
+                          <m:ctrlPr>
+                            <a:rPr lang="en-IE" b="0" i="1" smtClean="0">
+                              <a:latin typeface="Cambria Math" panose="02040503050406030204" pitchFamily="18" charset="0"/>
+                            </a:rPr>
+                          </m:ctrlPr>
+                        </m:naryPr>
+                        <m:sub>
+                          <m:r>
+                            <m:rPr>
+                              <m:brk m:alnAt="23"/>
+                            </m:rPr>
+                            <a:rPr lang="en-IE" b="0" i="1" smtClean="0">
+                              <a:latin typeface="Cambria Math" panose="02040503050406030204" pitchFamily="18" charset="0"/>
+                            </a:rPr>
+                            <m:t>𝑘</m:t>
+                          </m:r>
+                          <m:r>
+                            <a:rPr lang="en-IE" b="0" i="1" smtClean="0">
+                              <a:latin typeface="Cambria Math" panose="02040503050406030204" pitchFamily="18" charset="0"/>
+                            </a:rPr>
+                            <m:t>=1</m:t>
+                          </m:r>
+                        </m:sub>
+                        <m:sup>
+                          <m:r>
+                            <a:rPr lang="en-IE" b="0" i="1" smtClean="0">
+                              <a:latin typeface="Cambria Math" panose="02040503050406030204" pitchFamily="18" charset="0"/>
+                            </a:rPr>
+                            <m:t>𝐾</m:t>
+                          </m:r>
+                        </m:sup>
+                        <m:e>
+                          <m:sSub>
+                            <m:sSubPr>
+                              <m:ctrlPr>
+                                <a:rPr lang="en-IE" b="0" i="1" smtClean="0">
+                                  <a:latin typeface="Cambria Math" panose="02040503050406030204" pitchFamily="18" charset="0"/>
+                                </a:rPr>
+                              </m:ctrlPr>
+                            </m:sSubPr>
+                            <m:e>
+                              <m:r>
+                                <a:rPr lang="en-IE" b="0" i="1" smtClean="0">
+                                  <a:latin typeface="Cambria Math" panose="02040503050406030204" pitchFamily="18" charset="0"/>
+                                </a:rPr>
+                                <m:t>𝑐</m:t>
+                              </m:r>
+                            </m:e>
+                            <m:sub>
+                              <m:r>
+                                <a:rPr lang="en-IE" b="0" i="1" smtClean="0">
+                                  <a:latin typeface="Cambria Math" panose="02040503050406030204" pitchFamily="18" charset="0"/>
+                                </a:rPr>
+                                <m:t>𝑘</m:t>
+                              </m:r>
+                            </m:sub>
+                          </m:sSub>
+                          <m:sSub>
+                            <m:sSubPr>
+                              <m:ctrlPr>
+                                <a:rPr lang="en-IE" b="0" i="1" smtClean="0">
+                                  <a:latin typeface="Cambria Math" panose="02040503050406030204" pitchFamily="18" charset="0"/>
+                                </a:rPr>
+                              </m:ctrlPr>
+                            </m:sSubPr>
+                            <m:e>
+                              <m:r>
+                                <a:rPr lang="en-IE" b="0" i="1" smtClean="0">
+                                  <a:latin typeface="Cambria Math" panose="02040503050406030204" pitchFamily="18" charset="0"/>
+                                </a:rPr>
+                                <m:t>𝜙</m:t>
+                              </m:r>
+                            </m:e>
+                            <m:sub>
+                              <m:r>
+                                <a:rPr lang="en-IE" b="0" i="1" smtClean="0">
+                                  <a:latin typeface="Cambria Math" panose="02040503050406030204" pitchFamily="18" charset="0"/>
+                                </a:rPr>
+                                <m:t>𝑘</m:t>
+                              </m:r>
+                            </m:sub>
+                          </m:sSub>
+                          <m:r>
+                            <a:rPr lang="en-IE" b="0" i="1" smtClean="0">
+                              <a:latin typeface="Cambria Math" panose="02040503050406030204" pitchFamily="18" charset="0"/>
+                            </a:rPr>
+                            <m:t>(</m:t>
+                          </m:r>
+                          <m:r>
+                            <a:rPr lang="en-IE" b="0" i="1" smtClean="0">
+                              <a:latin typeface="Cambria Math" panose="02040503050406030204" pitchFamily="18" charset="0"/>
+                            </a:rPr>
+                            <m:t>𝑡</m:t>
+                          </m:r>
+                          <m:r>
+                            <a:rPr lang="en-IE" b="0" i="1" smtClean="0">
+                              <a:latin typeface="Cambria Math" panose="02040503050406030204" pitchFamily="18" charset="0"/>
+                            </a:rPr>
+                            <m:t>)</m:t>
+                          </m:r>
+                        </m:e>
+                      </m:nary>
+                    </m:oMath>
+                  </m:oMathPara>
+                </a14:m>
+                <a:endParaRPr lang="en-GB" dirty="0"/>
+              </a:p>
+            </p:txBody>
+          </p:sp>
+        </mc:Choice>
+        <mc:Fallback>
+          <p:sp>
+            <p:nvSpPr>
+              <p:cNvPr id="3" name="Content Placeholder 2">
+                <a:extLst>
+                  <a:ext uri="{FF2B5EF4-FFF2-40B4-BE49-F238E27FC236}">
+                    <a16:creationId xmlns:a16="http://schemas.microsoft.com/office/drawing/2014/main" id="{3E745B99-FFFC-2526-1DAC-D42BC20CC6AE}"/>
+                  </a:ext>
+                </a:extLst>
+              </p:cNvPr>
+              <p:cNvSpPr>
+                <a:spLocks noGrp="1" noRot="1" noChangeAspect="1" noMove="1" noResize="1" noEditPoints="1" noAdjustHandles="1" noChangeArrowheads="1" noChangeShapeType="1" noTextEdit="1"/>
+              </p:cNvSpPr>
+              <p:nvPr>
+                <p:ph idx="1"/>
+              </p:nvPr>
+            </p:nvSpPr>
+            <p:spPr>
+              <a:blipFill>
+                <a:blip r:embed="rId3"/>
+                <a:stretch>
+                  <a:fillRect l="-1206" t="-23837"/>
+                </a:stretch>
+              </a:blipFill>
+            </p:spPr>
+            <p:txBody>
+              <a:bodyPr/>
+              <a:lstStyle/>
+              <a:p>
+                <a:r>
+                  <a:rPr lang="en-GB">
+                    <a:noFill/>
+                  </a:rPr>
+                  <a:t> </a:t>
+                </a:r>
+              </a:p>
+            </p:txBody>
+          </p:sp>
+        </mc:Fallback>
+      </mc:AlternateContent>
+      <p:sp>
+        <p:nvSpPr>
+          <p:cNvPr id="6" name="TextBox 5">
+            <a:extLst>
+              <a:ext uri="{FF2B5EF4-FFF2-40B4-BE49-F238E27FC236}">
+                <a16:creationId xmlns:a16="http://schemas.microsoft.com/office/drawing/2014/main" id="{5A212776-1E2C-25EE-27FE-BDEA1957F7BD}"/>
+              </a:ext>
+            </a:extLst>
+          </p:cNvPr>
+          <p:cNvSpPr txBox="1"/>
+          <p:nvPr/>
+        </p:nvSpPr>
+        <p:spPr>
+          <a:xfrm>
+            <a:off x="4165600" y="3631962"/>
+            <a:ext cx="1663700" cy="369332"/>
+          </a:xfrm>
+          <a:prstGeom prst="rect">
+            <a:avLst/>
+          </a:prstGeom>
+          <a:noFill/>
+        </p:spPr>
+        <p:txBody>
+          <a:bodyPr wrap="square" rtlCol="0">
+            <a:spAutoFit/>
+          </a:bodyPr>
+          <a:lstStyle/>
+          <a:p>
+            <a:pPr algn="ctr"/>
+            <a:r>
+              <a:rPr lang="en-GB" dirty="0"/>
+              <a:t>Fitted Curve</a:t>
+            </a:r>
+          </a:p>
+        </p:txBody>
+      </p:sp>
+      <p:cxnSp>
+        <p:nvCxnSpPr>
+          <p:cNvPr id="8" name="Straight Arrow Connector 7">
+            <a:extLst>
+              <a:ext uri="{FF2B5EF4-FFF2-40B4-BE49-F238E27FC236}">
+                <a16:creationId xmlns:a16="http://schemas.microsoft.com/office/drawing/2014/main" id="{AFD47FA8-4F44-A12D-39A3-1969EC8B5590}"/>
+              </a:ext>
+            </a:extLst>
+          </p:cNvPr>
+          <p:cNvCxnSpPr>
+            <a:stCxn id="6" idx="0"/>
+          </p:cNvCxnSpPr>
+          <p:nvPr/>
+        </p:nvCxnSpPr>
+        <p:spPr>
+          <a:xfrm flipV="1">
+            <a:off x="4997450" y="3073400"/>
+            <a:ext cx="6350" cy="558562"/>
+          </a:xfrm>
+          <a:prstGeom prst="straightConnector1">
+            <a:avLst/>
+          </a:prstGeom>
+          <a:ln>
+            <a:tailEnd type="triangle"/>
+          </a:ln>
+        </p:spPr>
+        <p:style>
+          <a:lnRef idx="2">
+            <a:schemeClr val="accent1"/>
+          </a:lnRef>
+          <a:fillRef idx="0">
+            <a:schemeClr val="accent1"/>
+          </a:fillRef>
+          <a:effectRef idx="1">
+            <a:schemeClr val="accent1"/>
+          </a:effectRef>
+          <a:fontRef idx="minor">
+            <a:schemeClr val="tx1"/>
+          </a:fontRef>
+        </p:style>
+      </p:cxnSp>
+      <p:sp>
+        <p:nvSpPr>
+          <p:cNvPr id="9" name="TextBox 8">
+            <a:extLst>
+              <a:ext uri="{FF2B5EF4-FFF2-40B4-BE49-F238E27FC236}">
+                <a16:creationId xmlns:a16="http://schemas.microsoft.com/office/drawing/2014/main" id="{BAC103F7-A209-B03B-CEBA-84D6E3C57C14}"/>
+              </a:ext>
+            </a:extLst>
+          </p:cNvPr>
+          <p:cNvSpPr txBox="1"/>
+          <p:nvPr/>
+        </p:nvSpPr>
+        <p:spPr>
+          <a:xfrm>
+            <a:off x="5683250" y="3631962"/>
+            <a:ext cx="1663700" cy="646331"/>
+          </a:xfrm>
+          <a:prstGeom prst="rect">
+            <a:avLst/>
+          </a:prstGeom>
+          <a:noFill/>
+        </p:spPr>
+        <p:txBody>
+          <a:bodyPr wrap="square" rtlCol="0">
+            <a:spAutoFit/>
+          </a:bodyPr>
+          <a:lstStyle/>
+          <a:p>
+            <a:pPr algn="ctr"/>
+            <a:r>
+              <a:rPr lang="en-GB" dirty="0"/>
+              <a:t>Basis Coefficient</a:t>
+            </a:r>
+          </a:p>
+        </p:txBody>
+      </p:sp>
+      <p:cxnSp>
+        <p:nvCxnSpPr>
+          <p:cNvPr id="10" name="Straight Arrow Connector 9">
+            <a:extLst>
+              <a:ext uri="{FF2B5EF4-FFF2-40B4-BE49-F238E27FC236}">
+                <a16:creationId xmlns:a16="http://schemas.microsoft.com/office/drawing/2014/main" id="{B6F58551-A0EB-938B-9988-6AF4E77B7554}"/>
+              </a:ext>
+            </a:extLst>
+          </p:cNvPr>
+          <p:cNvCxnSpPr>
+            <a:stCxn id="9" idx="0"/>
+          </p:cNvCxnSpPr>
+          <p:nvPr/>
+        </p:nvCxnSpPr>
+        <p:spPr>
+          <a:xfrm flipV="1">
+            <a:off x="6515100" y="3073400"/>
+            <a:ext cx="6350" cy="558562"/>
+          </a:xfrm>
+          <a:prstGeom prst="straightConnector1">
+            <a:avLst/>
+          </a:prstGeom>
+          <a:ln>
+            <a:tailEnd type="triangle"/>
+          </a:ln>
+        </p:spPr>
+        <p:style>
+          <a:lnRef idx="2">
+            <a:schemeClr val="accent1"/>
+          </a:lnRef>
+          <a:fillRef idx="0">
+            <a:schemeClr val="accent1"/>
+          </a:fillRef>
+          <a:effectRef idx="1">
+            <a:schemeClr val="accent1"/>
+          </a:effectRef>
+          <a:fontRef idx="minor">
+            <a:schemeClr val="tx1"/>
+          </a:fontRef>
+        </p:style>
+      </p:cxnSp>
+      <p:sp>
+        <p:nvSpPr>
+          <p:cNvPr id="11" name="TextBox 10">
+            <a:extLst>
+              <a:ext uri="{FF2B5EF4-FFF2-40B4-BE49-F238E27FC236}">
+                <a16:creationId xmlns:a16="http://schemas.microsoft.com/office/drawing/2014/main" id="{EECB70B6-0858-11EA-B9A7-E1C6903B89C3}"/>
+              </a:ext>
+            </a:extLst>
+          </p:cNvPr>
+          <p:cNvSpPr txBox="1"/>
+          <p:nvPr/>
+        </p:nvSpPr>
+        <p:spPr>
+          <a:xfrm>
+            <a:off x="6175375" y="3631962"/>
+            <a:ext cx="1663700" cy="369332"/>
+          </a:xfrm>
+          <a:prstGeom prst="rect">
+            <a:avLst/>
+          </a:prstGeom>
+          <a:noFill/>
+        </p:spPr>
+        <p:txBody>
+          <a:bodyPr wrap="square" rtlCol="0">
+            <a:spAutoFit/>
+          </a:bodyPr>
+          <a:lstStyle/>
+          <a:p>
+            <a:pPr algn="ctr"/>
+            <a:r>
+              <a:rPr lang="en-GB" dirty="0"/>
+              <a:t>Basis Function</a:t>
+            </a:r>
+          </a:p>
+        </p:txBody>
+      </p:sp>
+      <p:cxnSp>
+        <p:nvCxnSpPr>
+          <p:cNvPr id="12" name="Straight Arrow Connector 11">
+            <a:extLst>
+              <a:ext uri="{FF2B5EF4-FFF2-40B4-BE49-F238E27FC236}">
+                <a16:creationId xmlns:a16="http://schemas.microsoft.com/office/drawing/2014/main" id="{786861EE-8066-3A8A-1026-A06AAA1AFEEF}"/>
+              </a:ext>
+            </a:extLst>
+          </p:cNvPr>
+          <p:cNvCxnSpPr>
+            <a:stCxn id="11" idx="0"/>
+          </p:cNvCxnSpPr>
+          <p:nvPr/>
+        </p:nvCxnSpPr>
+        <p:spPr>
+          <a:xfrm flipV="1">
+            <a:off x="7007225" y="3073400"/>
+            <a:ext cx="6350" cy="558562"/>
+          </a:xfrm>
+          <a:prstGeom prst="straightConnector1">
+            <a:avLst/>
+          </a:prstGeom>
+          <a:ln>
+            <a:tailEnd type="triangle"/>
+          </a:ln>
+        </p:spPr>
+        <p:style>
+          <a:lnRef idx="2">
+            <a:schemeClr val="accent1"/>
+          </a:lnRef>
+          <a:fillRef idx="0">
+            <a:schemeClr val="accent1"/>
+          </a:fillRef>
+          <a:effectRef idx="1">
+            <a:schemeClr val="accent1"/>
+          </a:effectRef>
+          <a:fontRef idx="minor">
+            <a:schemeClr val="tx1"/>
+          </a:fontRef>
+        </p:style>
+      </p:cxnSp>
+    </p:spTree>
+    <p:extLst>
+      <p:ext uri="{BB962C8B-B14F-4D97-AF65-F5344CB8AC3E}">
+        <p14:creationId xmlns:p14="http://schemas.microsoft.com/office/powerpoint/2010/main" val="1745501209"/>
+      </p:ext>
+    </p:extLst>
+  </p:cSld>
+  <p:clrMapOvr>
+    <a:masterClrMapping/>
+  </p:clrMapOvr>
+  <p:timing>
+    <p:tnLst>
+      <p:par>
+        <p:cTn id="1" dur="indefinite" restart="never" nodeType="tmRoot">
+          <p:childTnLst>
+            <p:seq concurrent="1" nextAc="seek">
+              <p:cTn id="2" dur="indefinite" nodeType="mainSeq">
+                <p:childTnLst>
+                  <p:par>
+                    <p:cTn id="3" fill="hold">
+                      <p:stCondLst>
+                        <p:cond delay="indefinite"/>
+                      </p:stCondLst>
+                      <p:childTnLst>
+                        <p:par>
+                          <p:cTn id="4" fill="hold">
+                            <p:stCondLst>
+                              <p:cond delay="0"/>
+                            </p:stCondLst>
+                            <p:childTnLst>
+                              <p:par>
+                                <p:cTn id="5" presetID="1" presetClass="entr" presetSubtype="0" fill="hold" nodeType="clickEffect">
+                                  <p:stCondLst>
+                                    <p:cond delay="0"/>
+                                  </p:stCondLst>
+                                  <p:childTnLst>
+                                    <p:set>
+                                      <p:cBhvr>
+                                        <p:cTn id="6" dur="1" fill="hold">
+                                          <p:stCondLst>
+                                            <p:cond delay="0"/>
+                                          </p:stCondLst>
+                                        </p:cTn>
+                                        <p:tgtEl>
+                                          <p:spTgt spid="8"/>
+                                        </p:tgtEl>
+                                        <p:attrNameLst>
+                                          <p:attrName>style.visibility</p:attrName>
+                                        </p:attrNameLst>
+                                      </p:cBhvr>
+                                      <p:to>
+                                        <p:strVal val="visible"/>
+                                      </p:to>
+                                    </p:set>
+                                  </p:childTnLst>
+                                </p:cTn>
+                              </p:par>
+                              <p:par>
+                                <p:cTn id="7" presetID="1" presetClass="entr" presetSubtype="0" fill="hold" grpId="0" nodeType="withEffect">
+                                  <p:stCondLst>
+                                    <p:cond delay="0"/>
+                                  </p:stCondLst>
+                                  <p:childTnLst>
+                                    <p:set>
+                                      <p:cBhvr>
+                                        <p:cTn id="8" dur="1" fill="hold">
+                                          <p:stCondLst>
+                                            <p:cond delay="0"/>
+                                          </p:stCondLst>
+                                        </p:cTn>
+                                        <p:tgtEl>
+                                          <p:spTgt spid="6"/>
+                                        </p:tgtEl>
+                                        <p:attrNameLst>
+                                          <p:attrName>style.visibility</p:attrName>
+                                        </p:attrNameLst>
+                                      </p:cBhvr>
+                                      <p:to>
+                                        <p:strVal val="visible"/>
+                                      </p:to>
+                                    </p:set>
+                                  </p:childTnLst>
+                                </p:cTn>
+                              </p:par>
+                            </p:childTnLst>
+                          </p:cTn>
+                        </p:par>
+                      </p:childTnLst>
+                    </p:cTn>
+                  </p:par>
+                  <p:par>
+                    <p:cTn id="9" fill="hold">
+                      <p:stCondLst>
+                        <p:cond delay="indefinite"/>
+                      </p:stCondLst>
+                      <p:childTnLst>
+                        <p:par>
+                          <p:cTn id="10" fill="hold">
+                            <p:stCondLst>
+                              <p:cond delay="0"/>
+                            </p:stCondLst>
+                            <p:childTnLst>
+                              <p:par>
+                                <p:cTn id="11" presetID="1" presetClass="exit" presetSubtype="0" fill="hold" nodeType="clickEffect">
+                                  <p:stCondLst>
+                                    <p:cond delay="0"/>
+                                  </p:stCondLst>
+                                  <p:childTnLst>
+                                    <p:set>
+                                      <p:cBhvr>
+                                        <p:cTn id="12" dur="1" fill="hold">
+                                          <p:stCondLst>
+                                            <p:cond delay="0"/>
+                                          </p:stCondLst>
+                                        </p:cTn>
+                                        <p:tgtEl>
+                                          <p:spTgt spid="8"/>
+                                        </p:tgtEl>
+                                        <p:attrNameLst>
+                                          <p:attrName>style.visibility</p:attrName>
+                                        </p:attrNameLst>
+                                      </p:cBhvr>
+                                      <p:to>
+                                        <p:strVal val="hidden"/>
+                                      </p:to>
+                                    </p:set>
+                                  </p:childTnLst>
+                                </p:cTn>
+                              </p:par>
+                              <p:par>
+                                <p:cTn id="13" presetID="1" presetClass="exit" presetSubtype="0" fill="hold" grpId="1" nodeType="withEffect">
+                                  <p:stCondLst>
+                                    <p:cond delay="0"/>
+                                  </p:stCondLst>
+                                  <p:childTnLst>
+                                    <p:set>
+                                      <p:cBhvr>
+                                        <p:cTn id="14" dur="1" fill="hold">
+                                          <p:stCondLst>
+                                            <p:cond delay="0"/>
+                                          </p:stCondLst>
+                                        </p:cTn>
+                                        <p:tgtEl>
+                                          <p:spTgt spid="6"/>
+                                        </p:tgtEl>
+                                        <p:attrNameLst>
+                                          <p:attrName>style.visibility</p:attrName>
+                                        </p:attrNameLst>
+                                      </p:cBhvr>
+                                      <p:to>
+                                        <p:strVal val="hidden"/>
+                                      </p:to>
+                                    </p:set>
+                                  </p:childTnLst>
+                                </p:cTn>
+                              </p:par>
+                            </p:childTnLst>
+                          </p:cTn>
+                        </p:par>
+                      </p:childTnLst>
+                    </p:cTn>
+                  </p:par>
+                  <p:par>
+                    <p:cTn id="15" fill="hold">
+                      <p:stCondLst>
+                        <p:cond delay="indefinite"/>
+                      </p:stCondLst>
+                      <p:childTnLst>
+                        <p:par>
+                          <p:cTn id="16" fill="hold">
+                            <p:stCondLst>
+                              <p:cond delay="0"/>
+                            </p:stCondLst>
+                            <p:childTnLst>
+                              <p:par>
+                                <p:cTn id="17" presetID="1" presetClass="entr" presetSubtype="0" fill="hold" grpId="0" nodeType="clickEffect">
+                                  <p:stCondLst>
+                                    <p:cond delay="0"/>
+                                  </p:stCondLst>
+                                  <p:childTnLst>
+                                    <p:set>
+                                      <p:cBhvr>
+                                        <p:cTn id="18" dur="1" fill="hold">
+                                          <p:stCondLst>
+                                            <p:cond delay="0"/>
+                                          </p:stCondLst>
+                                        </p:cTn>
+                                        <p:tgtEl>
+                                          <p:spTgt spid="9"/>
+                                        </p:tgtEl>
+                                        <p:attrNameLst>
+                                          <p:attrName>style.visibility</p:attrName>
+                                        </p:attrNameLst>
+                                      </p:cBhvr>
+                                      <p:to>
+                                        <p:strVal val="visible"/>
+                                      </p:to>
+                                    </p:set>
+                                  </p:childTnLst>
+                                </p:cTn>
+                              </p:par>
+                              <p:par>
+                                <p:cTn id="19" presetID="1" presetClass="entr" presetSubtype="0" fill="hold" nodeType="withEffect">
+                                  <p:stCondLst>
+                                    <p:cond delay="0"/>
+                                  </p:stCondLst>
+                                  <p:childTnLst>
+                                    <p:set>
+                                      <p:cBhvr>
+                                        <p:cTn id="20" dur="1" fill="hold">
+                                          <p:stCondLst>
+                                            <p:cond delay="0"/>
+                                          </p:stCondLst>
+                                        </p:cTn>
+                                        <p:tgtEl>
+                                          <p:spTgt spid="10"/>
+                                        </p:tgtEl>
+                                        <p:attrNameLst>
+                                          <p:attrName>style.visibility</p:attrName>
+                                        </p:attrNameLst>
+                                      </p:cBhvr>
+                                      <p:to>
+                                        <p:strVal val="visible"/>
+                                      </p:to>
+                                    </p:set>
+                                  </p:childTnLst>
+                                </p:cTn>
+                              </p:par>
+                            </p:childTnLst>
+                          </p:cTn>
+                        </p:par>
+                      </p:childTnLst>
+                    </p:cTn>
+                  </p:par>
+                  <p:par>
+                    <p:cTn id="21" fill="hold">
+                      <p:stCondLst>
+                        <p:cond delay="indefinite"/>
+                      </p:stCondLst>
+                      <p:childTnLst>
+                        <p:par>
+                          <p:cTn id="22" fill="hold">
+                            <p:stCondLst>
+                              <p:cond delay="0"/>
+                            </p:stCondLst>
+                            <p:childTnLst>
+                              <p:par>
+                                <p:cTn id="23" presetID="1" presetClass="exit" presetSubtype="0" fill="hold" grpId="1" nodeType="clickEffect">
+                                  <p:stCondLst>
+                                    <p:cond delay="0"/>
+                                  </p:stCondLst>
+                                  <p:childTnLst>
+                                    <p:set>
+                                      <p:cBhvr>
+                                        <p:cTn id="24" dur="1" fill="hold">
+                                          <p:stCondLst>
+                                            <p:cond delay="0"/>
+                                          </p:stCondLst>
+                                        </p:cTn>
+                                        <p:tgtEl>
+                                          <p:spTgt spid="9"/>
+                                        </p:tgtEl>
+                                        <p:attrNameLst>
+                                          <p:attrName>style.visibility</p:attrName>
+                                        </p:attrNameLst>
+                                      </p:cBhvr>
+                                      <p:to>
+                                        <p:strVal val="hidden"/>
+                                      </p:to>
+                                    </p:set>
+                                  </p:childTnLst>
+                                </p:cTn>
+                              </p:par>
+                            </p:childTnLst>
+                          </p:cTn>
+                        </p:par>
+                      </p:childTnLst>
+                    </p:cTn>
+                  </p:par>
+                  <p:par>
+                    <p:cTn id="25" fill="hold">
+                      <p:stCondLst>
+                        <p:cond delay="indefinite"/>
+                      </p:stCondLst>
+                      <p:childTnLst>
+                        <p:par>
+                          <p:cTn id="26" fill="hold">
+                            <p:stCondLst>
+                              <p:cond delay="0"/>
+                            </p:stCondLst>
+                            <p:childTnLst>
+                              <p:par>
+                                <p:cTn id="27" presetID="1" presetClass="entr" presetSubtype="0" fill="hold" grpId="1" nodeType="clickEffect">
+                                  <p:stCondLst>
+                                    <p:cond delay="0"/>
+                                  </p:stCondLst>
+                                  <p:childTnLst>
+                                    <p:set>
+                                      <p:cBhvr>
+                                        <p:cTn id="28" dur="1" fill="hold">
+                                          <p:stCondLst>
+                                            <p:cond delay="0"/>
+                                          </p:stCondLst>
+                                        </p:cTn>
+                                        <p:tgtEl>
+                                          <p:spTgt spid="11"/>
+                                        </p:tgtEl>
+                                        <p:attrNameLst>
+                                          <p:attrName>style.visibility</p:attrName>
+                                        </p:attrNameLst>
+                                      </p:cBhvr>
+                                      <p:to>
+                                        <p:strVal val="visible"/>
+                                      </p:to>
+                                    </p:set>
+                                  </p:childTnLst>
+                                </p:cTn>
+                              </p:par>
+                              <p:par>
+                                <p:cTn id="29" presetID="1" presetClass="entr" presetSubtype="0" fill="hold" nodeType="withEffect">
+                                  <p:stCondLst>
+                                    <p:cond delay="0"/>
+                                  </p:stCondLst>
+                                  <p:childTnLst>
+                                    <p:set>
+                                      <p:cBhvr>
+                                        <p:cTn id="30" dur="1" fill="hold">
+                                          <p:stCondLst>
+                                            <p:cond delay="0"/>
+                                          </p:stCondLst>
+                                        </p:cTn>
+                                        <p:tgtEl>
+                                          <p:spTgt spid="12"/>
+                                        </p:tgtEl>
+                                        <p:attrNameLst>
+                                          <p:attrName>style.visibility</p:attrName>
+                                        </p:attrNameLst>
+                                      </p:cBhvr>
+                                      <p:to>
+                                        <p:strVal val="visible"/>
+                                      </p:to>
+                                    </p:set>
+                                  </p:childTnLst>
+                                </p:cTn>
+                              </p:par>
+                              <p:par>
+                                <p:cTn id="31" presetID="1" presetClass="exit" presetSubtype="0" fill="hold" nodeType="withEffect">
+                                  <p:stCondLst>
+                                    <p:cond delay="0"/>
+                                  </p:stCondLst>
+                                  <p:childTnLst>
+                                    <p:set>
+                                      <p:cBhvr>
+                                        <p:cTn id="32" dur="1" fill="hold">
+                                          <p:stCondLst>
+                                            <p:cond delay="0"/>
+                                          </p:stCondLst>
+                                        </p:cTn>
+                                        <p:tgtEl>
+                                          <p:spTgt spid="10"/>
+                                        </p:tgtEl>
+                                        <p:attrNameLst>
+                                          <p:attrName>style.visibility</p:attrName>
+                                        </p:attrNameLst>
+                                      </p:cBhvr>
+                                      <p:to>
+                                        <p:strVal val="hidden"/>
+                                      </p:to>
+                                    </p:set>
+                                  </p:childTnLst>
+                                </p:cTn>
+                              </p:par>
+                            </p:childTnLst>
+                          </p:cTn>
+                        </p:par>
+                      </p:childTnLst>
+                    </p:cTn>
+                  </p:par>
+                  <p:par>
+                    <p:cTn id="33" fill="hold">
+                      <p:stCondLst>
+                        <p:cond delay="indefinite"/>
+                      </p:stCondLst>
+                      <p:childTnLst>
+                        <p:par>
+                          <p:cTn id="34" fill="hold">
+                            <p:stCondLst>
+                              <p:cond delay="0"/>
+                            </p:stCondLst>
+                            <p:childTnLst>
+                              <p:par>
+                                <p:cTn id="35" presetID="1" presetClass="exit" presetSubtype="0" fill="hold" grpId="0" nodeType="clickEffect">
+                                  <p:stCondLst>
+                                    <p:cond delay="0"/>
+                                  </p:stCondLst>
+                                  <p:childTnLst>
+                                    <p:set>
+                                      <p:cBhvr>
+                                        <p:cTn id="36" dur="1" fill="hold">
+                                          <p:stCondLst>
+                                            <p:cond delay="0"/>
+                                          </p:stCondLst>
+                                        </p:cTn>
+                                        <p:tgtEl>
+                                          <p:spTgt spid="11"/>
+                                        </p:tgtEl>
+                                        <p:attrNameLst>
+                                          <p:attrName>style.visibility</p:attrName>
+                                        </p:attrNameLst>
+                                      </p:cBhvr>
+                                      <p:to>
+                                        <p:strVal val="hidden"/>
+                                      </p:to>
+                                    </p:set>
+                                  </p:childTnLst>
+                                </p:cTn>
+                              </p:par>
+                              <p:par>
+                                <p:cTn id="37" presetID="1" presetClass="exit" presetSubtype="0" fill="hold" nodeType="withEffect">
+                                  <p:stCondLst>
+                                    <p:cond delay="0"/>
+                                  </p:stCondLst>
+                                  <p:childTnLst>
+                                    <p:set>
+                                      <p:cBhvr>
+                                        <p:cTn id="38" dur="1" fill="hold">
+                                          <p:stCondLst>
+                                            <p:cond delay="0"/>
+                                          </p:stCondLst>
+                                        </p:cTn>
+                                        <p:tgtEl>
+                                          <p:spTgt spid="12"/>
+                                        </p:tgtEl>
+                                        <p:attrNameLst>
+                                          <p:attrName>style.visibility</p:attrName>
+                                        </p:attrNameLst>
+                                      </p:cBhvr>
+                                      <p:to>
+                                        <p:strVal val="hidden"/>
+                                      </p:to>
+                                    </p:set>
+                                  </p:childTnLst>
+                                </p:cTn>
+                              </p:par>
+                            </p:childTnLst>
+                          </p:cTn>
+                        </p:par>
+                      </p:childTnLst>
+                    </p:cTn>
+                  </p:par>
+                  <p:par>
+                    <p:cTn id="39" fill="hold">
+                      <p:stCondLst>
+                        <p:cond delay="indefinite"/>
+                      </p:stCondLst>
+                      <p:childTnLst>
+                        <p:par>
+                          <p:cTn id="40" fill="hold">
+                            <p:stCondLst>
+                              <p:cond delay="0"/>
+                            </p:stCondLst>
+                            <p:childTnLst>
+                              <p:par>
+                                <p:cTn id="41" presetID="1" presetClass="entr" presetSubtype="0" fill="hold" nodeType="clickEffect">
+                                  <p:stCondLst>
+                                    <p:cond delay="0"/>
+                                  </p:stCondLst>
+                                  <p:childTnLst>
+                                    <p:set>
+                                      <p:cBhvr>
+                                        <p:cTn id="42" dur="1" fill="hold">
+                                          <p:stCondLst>
+                                            <p:cond delay="0"/>
+                                          </p:stCondLst>
+                                        </p:cTn>
+                                        <p:tgtEl>
+                                          <p:spTgt spid="13"/>
+                                        </p:tgtEl>
+                                        <p:attrNameLst>
+                                          <p:attrName>style.visibility</p:attrName>
+                                        </p:attrNameLst>
+                                      </p:cBhvr>
+                                      <p:to>
+                                        <p:strVal val="visible"/>
+                                      </p:to>
+                                    </p:set>
+                                  </p:childTnLst>
+                                </p:cTn>
+                              </p:par>
+                            </p:childTnLst>
+                          </p:cTn>
+                        </p:par>
+                      </p:childTnLst>
+                    </p:cTn>
+                  </p:par>
+                </p:childTnLst>
+              </p:cTn>
+              <p:prevCondLst>
+                <p:cond evt="onPrev" delay="0">
+                  <p:tgtEl>
+                    <p:sldTgt/>
+                  </p:tgtEl>
+                </p:cond>
+              </p:prevCondLst>
+              <p:nextCondLst>
+                <p:cond evt="onNext" delay="0">
+                  <p:tgtEl>
+                    <p:sldTgt/>
+                  </p:tgtEl>
+                </p:cond>
+              </p:nextCondLst>
+            </p:seq>
+          </p:childTnLst>
+        </p:cTn>
+      </p:par>
+    </p:tnLst>
+    <p:bldLst>
+      <p:bldP spid="6" grpId="0"/>
+      <p:bldP spid="6" grpId="1"/>
+      <p:bldP spid="9" grpId="0"/>
+      <p:bldP spid="9" grpId="1"/>
+      <p:bldP spid="11" grpId="0"/>
+      <p:bldP spid="11" grpId="1"/>
     </p:bldLst>
   </p:timing>
 </p:sld>

</xml_diff>